<commit_message>
last minute changes for 00 and 00, fall 2020
</commit_message>
<xml_diff>
--- a/C0-preliminaries.pptx
+++ b/C0-preliminaries.pptx
@@ -5,7 +5,7 @@
     <p:sldMasterId id="2147483648" r:id="rId1"/>
   </p:sldMasterIdLst>
   <p:notesMasterIdLst>
-    <p:notesMasterId r:id="rId17"/>
+    <p:notesMasterId r:id="rId18"/>
   </p:notesMasterIdLst>
   <p:sldIdLst>
     <p:sldId id="256" r:id="rId2"/>
@@ -18,11 +18,12 @@
     <p:sldId id="262" r:id="rId9"/>
     <p:sldId id="268" r:id="rId10"/>
     <p:sldId id="264" r:id="rId11"/>
-    <p:sldId id="265" r:id="rId12"/>
-    <p:sldId id="270" r:id="rId13"/>
-    <p:sldId id="269" r:id="rId14"/>
-    <p:sldId id="267" r:id="rId15"/>
-    <p:sldId id="263" r:id="rId16"/>
+    <p:sldId id="271" r:id="rId12"/>
+    <p:sldId id="265" r:id="rId13"/>
+    <p:sldId id="270" r:id="rId14"/>
+    <p:sldId id="269" r:id="rId15"/>
+    <p:sldId id="267" r:id="rId16"/>
+    <p:sldId id="263" r:id="rId17"/>
   </p:sldIdLst>
   <p:sldSz cx="12192000" cy="6858000"/>
   <p:notesSz cx="6858000" cy="9144000"/>
@@ -211,7 +212,7 @@
           <a:p>
             <a:fld id="{B1705F56-3A3C-9F45-82E1-974975E83314}" type="datetimeFigureOut">
               <a:rPr lang="en-US" smtClean="0"/>
-              <a:t>3/22/20</a:t>
+              <a:t>8/21/20</a:t>
             </a:fld>
             <a:endParaRPr lang="en-US"/>
           </a:p>
@@ -625,7 +626,7 @@
           <a:p>
             <a:fld id="{B636A413-A1CC-CD48-9584-751D89CE81E1}" type="datetime1">
               <a:rPr lang="en-US" smtClean="0"/>
-              <a:t>3/22/20</a:t>
+              <a:t>8/21/20</a:t>
             </a:fld>
             <a:endParaRPr lang="en-US"/>
           </a:p>
@@ -826,7 +827,7 @@
           <a:p>
             <a:fld id="{E1354D63-68F0-9647-B536-4263FBF27E9F}" type="datetime1">
               <a:rPr lang="en-US" smtClean="0"/>
-              <a:t>3/22/20</a:t>
+              <a:t>8/21/20</a:t>
             </a:fld>
             <a:endParaRPr lang="en-US"/>
           </a:p>
@@ -1037,7 +1038,7 @@
           <a:p>
             <a:fld id="{F5D9CFB9-61F7-8A4C-AD69-67C2D113D776}" type="datetime1">
               <a:rPr lang="en-US" smtClean="0"/>
-              <a:t>3/22/20</a:t>
+              <a:t>8/21/20</a:t>
             </a:fld>
             <a:endParaRPr lang="en-US"/>
           </a:p>
@@ -1238,7 +1239,7 @@
           <a:p>
             <a:fld id="{FAD571EC-F5A0-FD49-8239-D310E199B9F3}" type="datetime1">
               <a:rPr lang="en-US" smtClean="0"/>
-              <a:t>3/22/20</a:t>
+              <a:t>8/21/20</a:t>
             </a:fld>
             <a:endParaRPr lang="en-US"/>
           </a:p>
@@ -1516,7 +1517,7 @@
           <a:p>
             <a:fld id="{BC16F984-79D0-D341-8C08-3C6D93E11D18}" type="datetime1">
               <a:rPr lang="en-US" smtClean="0"/>
-              <a:t>3/22/20</a:t>
+              <a:t>8/21/20</a:t>
             </a:fld>
             <a:endParaRPr lang="en-US"/>
           </a:p>
@@ -1784,7 +1785,7 @@
           <a:p>
             <a:fld id="{5A5A3D16-5D9A-6D4D-85BF-98D6AFE50F81}" type="datetime1">
               <a:rPr lang="en-US" smtClean="0"/>
-              <a:t>3/22/20</a:t>
+              <a:t>8/21/20</a:t>
             </a:fld>
             <a:endParaRPr lang="en-US"/>
           </a:p>
@@ -2199,7 +2200,7 @@
           <a:p>
             <a:fld id="{FAC4073C-E934-844C-850F-5144159CD358}" type="datetime1">
               <a:rPr lang="en-US" smtClean="0"/>
-              <a:t>3/22/20</a:t>
+              <a:t>8/21/20</a:t>
             </a:fld>
             <a:endParaRPr lang="en-US"/>
           </a:p>
@@ -2343,7 +2344,7 @@
           <a:p>
             <a:fld id="{2BF32EF1-264C-B948-B02C-28DB295F8177}" type="datetime1">
               <a:rPr lang="en-US" smtClean="0"/>
-              <a:t>3/22/20</a:t>
+              <a:t>8/21/20</a:t>
             </a:fld>
             <a:endParaRPr lang="en-US"/>
           </a:p>
@@ -2459,7 +2460,7 @@
           <a:p>
             <a:fld id="{50BD370F-BC0F-4547-BA0C-9B1A91BB0139}" type="datetime1">
               <a:rPr lang="en-US" smtClean="0"/>
-              <a:t>3/22/20</a:t>
+              <a:t>8/21/20</a:t>
             </a:fld>
             <a:endParaRPr lang="en-US"/>
           </a:p>
@@ -2773,7 +2774,7 @@
           <a:p>
             <a:fld id="{410B318A-D3FE-0A45-8302-770BB2BBADA1}" type="datetime1">
               <a:rPr lang="en-US" smtClean="0"/>
-              <a:t>3/22/20</a:t>
+              <a:t>8/21/20</a:t>
             </a:fld>
             <a:endParaRPr lang="en-US"/>
           </a:p>
@@ -3064,7 +3065,7 @@
           <a:p>
             <a:fld id="{71D2B0EA-B374-764B-A3CE-44052DF0C9A6}" type="datetime1">
               <a:rPr lang="en-US" smtClean="0"/>
-              <a:t>3/22/20</a:t>
+              <a:t>8/21/20</a:t>
             </a:fld>
             <a:endParaRPr lang="en-US"/>
           </a:p>
@@ -3308,7 +3309,7 @@
           <a:p>
             <a:fld id="{683A4360-EFAF-A345-A6F4-DC5461235985}" type="datetime1">
               <a:rPr lang="en-US" smtClean="0"/>
-              <a:t>3/22/20</a:t>
+              <a:t>8/21/20</a:t>
             </a:fld>
             <a:endParaRPr lang="en-US"/>
           </a:p>
@@ -3753,7 +3754,7 @@
         </p:spPr>
         <p:txBody>
           <a:bodyPr>
-            <a:normAutofit/>
+            <a:normAutofit fontScale="90000"/>
           </a:bodyPr>
           <a:lstStyle/>
           <a:p>
@@ -3770,6 +3771,16 @@
             <a:r>
               <a:rPr lang="en-US" dirty="0"/>
               <a:t>CS 3323</a:t>
+            </a:r>
+            <a:br>
+              <a:rPr lang="en-US" dirty="0"/>
+            </a:br>
+            <a:br>
+              <a:rPr lang="en-US" dirty="0"/>
+            </a:br>
+            <a:r>
+              <a:rPr lang="en-US" dirty="0"/>
+              <a:t>Preliminaries</a:t>
             </a:r>
           </a:p>
         </p:txBody>
@@ -3851,7 +3862,7 @@
         <p:spPr/>
         <p:txBody>
           <a:bodyPr>
-            <a:normAutofit/>
+            <a:normAutofit fontScale="92500" lnSpcReduction="10000"/>
           </a:bodyPr>
           <a:lstStyle/>
           <a:p>
@@ -3863,6 +3874,12 @@
           <a:p>
             <a:r>
               <a:rPr lang="en-US" sz="2400" dirty="0"/>
+              <a:t>Just learnt last semester that one can install and run Linux on Windows, but I still don’t like it.</a:t>
+            </a:r>
+          </a:p>
+          <a:p>
+            <a:r>
+              <a:rPr lang="en-US" sz="2400" dirty="0"/>
               <a:t>Recommend checking that you have the following tools installed and accessible somewhere:</a:t>
             </a:r>
           </a:p>
@@ -3906,6 +3923,20 @@
             <a:r>
               <a:rPr lang="en-US" sz="2400" dirty="0"/>
               <a:t>You will need some knowledge of C</a:t>
+            </a:r>
+          </a:p>
+          <a:p>
+            <a:r>
+              <a:rPr lang="en-US" sz="2400" dirty="0"/>
+              <a:t>Read / learn about package managers such as: </a:t>
+            </a:r>
+            <a:r>
+              <a:rPr lang="en-US" sz="2400" b="1" u="sng" dirty="0"/>
+              <a:t>apt</a:t>
+            </a:r>
+            <a:r>
+              <a:rPr lang="en-US" sz="2400" dirty="0"/>
+              <a:t> in Ubuntu Linux</a:t>
             </a:r>
           </a:p>
         </p:txBody>
@@ -4002,7 +4033,7 @@
           <p:cNvPr id="2" name="Title 1">
             <a:extLst>
               <a:ext uri="{FF2B5EF4-FFF2-40B4-BE49-F238E27FC236}">
-                <a16:creationId xmlns:a16="http://schemas.microsoft.com/office/drawing/2014/main" id="{56C1BADF-A8CD-D44D-8443-4EBE734C8C6B}"/>
+                <a16:creationId xmlns:a16="http://schemas.microsoft.com/office/drawing/2014/main" id="{6C819103-4D2E-EA4D-982D-7E8FFDF85915}"/>
               </a:ext>
             </a:extLst>
           </p:cNvPr>
@@ -4020,7 +4051,7 @@
           <a:p>
             <a:r>
               <a:rPr lang="en-US" dirty="0"/>
-              <a:t>What the Course is about</a:t>
+              <a:t>My Office Hours</a:t>
             </a:r>
           </a:p>
         </p:txBody>
@@ -4030,7 +4061,7 @@
           <p:cNvPr id="3" name="Content Placeholder 2">
             <a:extLst>
               <a:ext uri="{FF2B5EF4-FFF2-40B4-BE49-F238E27FC236}">
-                <a16:creationId xmlns:a16="http://schemas.microsoft.com/office/drawing/2014/main" id="{F0C405B1-772E-374B-BA5B-A5B9B5932880}"/>
+                <a16:creationId xmlns:a16="http://schemas.microsoft.com/office/drawing/2014/main" id="{683FC7C2-C535-8A4E-B407-4FD61C03A0A8}"/>
               </a:ext>
             </a:extLst>
           </p:cNvPr>
@@ -4043,30 +4074,56 @@
         </p:nvSpPr>
         <p:spPr/>
         <p:txBody>
-          <a:bodyPr/>
-          <a:lstStyle/>
-          <a:p>
-            <a:r>
-              <a:rPr lang="en-US" dirty="0"/>
-              <a:t>Learning some fundamentals of programming language and compiler design</a:t>
-            </a:r>
-          </a:p>
-          <a:p>
-            <a:r>
-              <a:rPr lang="en-US" dirty="0"/>
-              <a:t>Learning how stuff works</a:t>
-            </a:r>
-          </a:p>
-          <a:p>
-            <a:r>
-              <a:rPr lang="en-US" dirty="0"/>
-              <a:t>Can be a bit boring at times </a:t>
-            </a:r>
-          </a:p>
-          <a:p>
-            <a:r>
-              <a:rPr lang="en-US" dirty="0"/>
-              <a:t>Will try to make it a bit hands on, but time is limited</a:t>
+          <a:bodyPr>
+            <a:normAutofit/>
+          </a:bodyPr>
+          <a:lstStyle/>
+          <a:p>
+            <a:pPr>
+              <a:lnSpc>
+                <a:spcPct val="125000"/>
+              </a:lnSpc>
+            </a:pPr>
+            <a:r>
+              <a:rPr lang="en-US" dirty="0"/>
+              <a:t>Regular office hours scheduled for Mondays and Wednesday, 11am – 12pm, and only via Zoom (See Canvas Pages).</a:t>
+            </a:r>
+          </a:p>
+          <a:p>
+            <a:pPr>
+              <a:lnSpc>
+                <a:spcPct val="125000"/>
+              </a:lnSpc>
+            </a:pPr>
+            <a:r>
+              <a:rPr lang="en-US" dirty="0"/>
+              <a:t>No in-person walk-in office hours.</a:t>
+            </a:r>
+          </a:p>
+          <a:p>
+            <a:pPr>
+              <a:lnSpc>
+                <a:spcPct val="125000"/>
+              </a:lnSpc>
+            </a:pPr>
+            <a:r>
+              <a:rPr lang="en-US" dirty="0"/>
+              <a:t>If the above time slot does not fit your schedule, let me know, and will find </a:t>
+            </a:r>
+            <a:r>
+              <a:rPr lang="en-US" i="1" u="sng" dirty="0"/>
+              <a:t>an ad-hoc slot for a meeting within the next two days</a:t>
+            </a:r>
+          </a:p>
+          <a:p>
+            <a:pPr>
+              <a:lnSpc>
+                <a:spcPct val="125000"/>
+              </a:lnSpc>
+            </a:pPr>
+            <a:r>
+              <a:rPr lang="en-US" dirty="0"/>
+              <a:t>If you request for a meeting in a shorter time window, it might not happen.</a:t>
             </a:r>
           </a:p>
         </p:txBody>
@@ -4076,7 +4133,7 @@
           <p:cNvPr id="4" name="Footer Placeholder 3">
             <a:extLst>
               <a:ext uri="{FF2B5EF4-FFF2-40B4-BE49-F238E27FC236}">
-                <a16:creationId xmlns:a16="http://schemas.microsoft.com/office/drawing/2014/main" id="{346E0D60-E348-8440-86AF-AD86C3EDA280}"/>
+                <a16:creationId xmlns:a16="http://schemas.microsoft.com/office/drawing/2014/main" id="{EBCE3728-6051-1549-AB1F-1AB1972DCAF8}"/>
               </a:ext>
             </a:extLst>
           </p:cNvPr>
@@ -4104,7 +4161,7 @@
           <p:cNvPr id="5" name="Slide Number Placeholder 4">
             <a:extLst>
               <a:ext uri="{FF2B5EF4-FFF2-40B4-BE49-F238E27FC236}">
-                <a16:creationId xmlns:a16="http://schemas.microsoft.com/office/drawing/2014/main" id="{75F13AE2-2C9C-0548-A57D-41C4CB9E2E7B}"/>
+                <a16:creationId xmlns:a16="http://schemas.microsoft.com/office/drawing/2014/main" id="{E42A61CA-E5C8-2A4D-B3B5-8DD597EE17E8}"/>
               </a:ext>
             </a:extLst>
           </p:cNvPr>
@@ -4131,7 +4188,7 @@
     </p:spTree>
     <p:extLst>
       <p:ext uri="{BB962C8B-B14F-4D97-AF65-F5344CB8AC3E}">
-        <p14:creationId xmlns:p14="http://schemas.microsoft.com/office/powerpoint/2010/main" val="2650601950"/>
+        <p14:creationId xmlns:p14="http://schemas.microsoft.com/office/powerpoint/2010/main" val="2952531595"/>
       </p:ext>
     </p:extLst>
   </p:cSld>
@@ -4163,7 +4220,7 @@
           <p:cNvPr id="2" name="Title 1">
             <a:extLst>
               <a:ext uri="{FF2B5EF4-FFF2-40B4-BE49-F238E27FC236}">
-                <a16:creationId xmlns:a16="http://schemas.microsoft.com/office/drawing/2014/main" id="{89B07FAE-1994-E840-ABC0-C467BEB13E2A}"/>
+                <a16:creationId xmlns:a16="http://schemas.microsoft.com/office/drawing/2014/main" id="{56C1BADF-A8CD-D44D-8443-4EBE734C8C6B}"/>
               </a:ext>
             </a:extLst>
           </p:cNvPr>
@@ -4181,7 +4238,7 @@
           <a:p>
             <a:r>
               <a:rPr lang="en-US" dirty="0"/>
-              <a:t>Textbook</a:t>
+              <a:t>What the Course is about</a:t>
             </a:r>
           </a:p>
         </p:txBody>
@@ -4191,7 +4248,7 @@
           <p:cNvPr id="3" name="Content Placeholder 2">
             <a:extLst>
               <a:ext uri="{FF2B5EF4-FFF2-40B4-BE49-F238E27FC236}">
-                <a16:creationId xmlns:a16="http://schemas.microsoft.com/office/drawing/2014/main" id="{A9E67FE1-EEFD-0E43-A281-4E2E66C8ED6F}"/>
+                <a16:creationId xmlns:a16="http://schemas.microsoft.com/office/drawing/2014/main" id="{F0C405B1-772E-374B-BA5B-A5B9B5932880}"/>
               </a:ext>
             </a:extLst>
           </p:cNvPr>
@@ -4204,113 +4261,31 @@
         </p:nvSpPr>
         <p:spPr/>
         <p:txBody>
-          <a:bodyPr>
-            <a:normAutofit fontScale="92500" lnSpcReduction="10000"/>
-          </a:bodyPr>
-          <a:lstStyle/>
-          <a:p>
-            <a:r>
-              <a:rPr lang="en-US" dirty="0"/>
-              <a:t>“Programming Language Pragmatics”, by Michael L. Scott, 4</a:t>
-            </a:r>
-            <a:r>
-              <a:rPr lang="en-US" baseline="30000" dirty="0"/>
-              <a:t>th</a:t>
-            </a:r>
-            <a:r>
-              <a:rPr lang="en-US" dirty="0"/>
-              <a:t> edition</a:t>
-            </a:r>
-          </a:p>
-          <a:p>
-            <a:endParaRPr lang="en-US" dirty="0"/>
-          </a:p>
-          <a:p>
-            <a:pPr marL="0" indent="0">
-              <a:buNone/>
-            </a:pPr>
-            <a:r>
-              <a:rPr lang="en-US" dirty="0"/>
-              <a:t>Alternative books:</a:t>
-            </a:r>
-          </a:p>
-          <a:p>
-            <a:r>
-              <a:rPr lang="en-US" dirty="0"/>
-              <a:t>“Compilers: Principles, Techniques and Tools”, by </a:t>
-            </a:r>
-            <a:r>
-              <a:rPr lang="en-US" dirty="0" err="1"/>
-              <a:t>Aho</a:t>
-            </a:r>
-            <a:r>
-              <a:rPr lang="en-US" dirty="0"/>
-              <a:t>, </a:t>
-            </a:r>
-            <a:r>
-              <a:rPr lang="en-US" dirty="0" err="1"/>
-              <a:t>Sethi</a:t>
-            </a:r>
-            <a:r>
-              <a:rPr lang="en-US" dirty="0"/>
-              <a:t> and Ullman (1986) or by </a:t>
-            </a:r>
-            <a:r>
-              <a:rPr lang="en-US" dirty="0" err="1"/>
-              <a:t>Aho</a:t>
-            </a:r>
-            <a:r>
-              <a:rPr lang="en-US" dirty="0"/>
-              <a:t>, Lam, </a:t>
-            </a:r>
-            <a:r>
-              <a:rPr lang="en-US" dirty="0" err="1"/>
-              <a:t>Sethi</a:t>
-            </a:r>
-            <a:r>
-              <a:rPr lang="en-US" dirty="0"/>
-              <a:t> and Ulman (2006)</a:t>
-            </a:r>
-          </a:p>
-          <a:p>
-            <a:r>
-              <a:rPr lang="en-US" dirty="0"/>
-              <a:t>“Engineering: A Compiler”, Cooper and </a:t>
-            </a:r>
-            <a:r>
-              <a:rPr lang="en-US" dirty="0" err="1"/>
-              <a:t>Torczon</a:t>
-            </a:r>
-            <a:endParaRPr lang="en-US" b="1" dirty="0"/>
-          </a:p>
-          <a:p>
-            <a:pPr marL="0" indent="0">
-              <a:buNone/>
-            </a:pPr>
-            <a:endParaRPr lang="en-US" dirty="0"/>
-          </a:p>
-          <a:p>
-            <a:pPr marL="0" indent="0">
-              <a:buNone/>
-            </a:pPr>
-            <a:r>
-              <a:rPr lang="en-US" dirty="0"/>
-              <a:t>Any of the above books will do</a:t>
-            </a:r>
-          </a:p>
-          <a:p>
-            <a:pPr marL="0" indent="0">
-              <a:buNone/>
-            </a:pPr>
-            <a:r>
-              <a:rPr lang="en-US" dirty="0"/>
-              <a:t>I will try to upload the slides before the following class; likely up to the </a:t>
-            </a:r>
-            <a:r>
-              <a:rPr lang="en-US"/>
-              <a:t>night before</a:t>
-            </a:r>
-            <a:endParaRPr lang="en-US" dirty="0"/>
+          <a:bodyPr/>
+          <a:lstStyle/>
+          <a:p>
+            <a:r>
+              <a:rPr lang="en-US" dirty="0"/>
+              <a:t>Learning some fundamentals of programming language and compiler design</a:t>
+            </a:r>
+          </a:p>
+          <a:p>
+            <a:r>
+              <a:rPr lang="en-US" dirty="0"/>
+              <a:t>Learning how stuff works</a:t>
+            </a:r>
+          </a:p>
+          <a:p>
+            <a:r>
+              <a:rPr lang="en-US" dirty="0"/>
+              <a:t>Can be a bit boring at times </a:t>
+            </a:r>
+          </a:p>
+          <a:p>
+            <a:r>
+              <a:rPr lang="en-US" dirty="0"/>
+              <a:t>Will try to make it a bit hands on, but time is limited</a:t>
+            </a:r>
           </a:p>
         </p:txBody>
       </p:sp>
@@ -4319,7 +4294,7 @@
           <p:cNvPr id="4" name="Footer Placeholder 3">
             <a:extLst>
               <a:ext uri="{FF2B5EF4-FFF2-40B4-BE49-F238E27FC236}">
-                <a16:creationId xmlns:a16="http://schemas.microsoft.com/office/drawing/2014/main" id="{6CCEF927-D631-FF4B-91A1-F6DA5935BAB0}"/>
+                <a16:creationId xmlns:a16="http://schemas.microsoft.com/office/drawing/2014/main" id="{346E0D60-E348-8440-86AF-AD86C3EDA280}"/>
               </a:ext>
             </a:extLst>
           </p:cNvPr>
@@ -4347,7 +4322,7 @@
           <p:cNvPr id="5" name="Slide Number Placeholder 4">
             <a:extLst>
               <a:ext uri="{FF2B5EF4-FFF2-40B4-BE49-F238E27FC236}">
-                <a16:creationId xmlns:a16="http://schemas.microsoft.com/office/drawing/2014/main" id="{149A53D0-7E6F-7249-A369-A2BCC1F884B1}"/>
+                <a16:creationId xmlns:a16="http://schemas.microsoft.com/office/drawing/2014/main" id="{75F13AE2-2C9C-0548-A57D-41C4CB9E2E7B}"/>
               </a:ext>
             </a:extLst>
           </p:cNvPr>
@@ -4374,7 +4349,7 @@
     </p:spTree>
     <p:extLst>
       <p:ext uri="{BB962C8B-B14F-4D97-AF65-F5344CB8AC3E}">
-        <p14:creationId xmlns:p14="http://schemas.microsoft.com/office/powerpoint/2010/main" val="1187641740"/>
+        <p14:creationId xmlns:p14="http://schemas.microsoft.com/office/powerpoint/2010/main" val="2650601950"/>
       </p:ext>
     </p:extLst>
   </p:cSld>
@@ -4406,6 +4381,241 @@
           <p:cNvPr id="2" name="Title 1">
             <a:extLst>
               <a:ext uri="{FF2B5EF4-FFF2-40B4-BE49-F238E27FC236}">
+                <a16:creationId xmlns:a16="http://schemas.microsoft.com/office/drawing/2014/main" id="{89B07FAE-1994-E840-ABC0-C467BEB13E2A}"/>
+              </a:ext>
+            </a:extLst>
+          </p:cNvPr>
+          <p:cNvSpPr>
+            <a:spLocks noGrp="1"/>
+          </p:cNvSpPr>
+          <p:nvPr>
+            <p:ph type="title"/>
+          </p:nvPr>
+        </p:nvSpPr>
+        <p:spPr/>
+        <p:txBody>
+          <a:bodyPr/>
+          <a:lstStyle/>
+          <a:p>
+            <a:r>
+              <a:rPr lang="en-US" dirty="0"/>
+              <a:t>Textbook</a:t>
+            </a:r>
+          </a:p>
+        </p:txBody>
+      </p:sp>
+      <p:sp>
+        <p:nvSpPr>
+          <p:cNvPr id="3" name="Content Placeholder 2">
+            <a:extLst>
+              <a:ext uri="{FF2B5EF4-FFF2-40B4-BE49-F238E27FC236}">
+                <a16:creationId xmlns:a16="http://schemas.microsoft.com/office/drawing/2014/main" id="{A9E67FE1-EEFD-0E43-A281-4E2E66C8ED6F}"/>
+              </a:ext>
+            </a:extLst>
+          </p:cNvPr>
+          <p:cNvSpPr>
+            <a:spLocks noGrp="1"/>
+          </p:cNvSpPr>
+          <p:nvPr>
+            <p:ph idx="1"/>
+          </p:nvPr>
+        </p:nvSpPr>
+        <p:spPr/>
+        <p:txBody>
+          <a:bodyPr>
+            <a:normAutofit lnSpcReduction="10000"/>
+          </a:bodyPr>
+          <a:lstStyle/>
+          <a:p>
+            <a:pPr marL="0" indent="0">
+              <a:buNone/>
+            </a:pPr>
+            <a:r>
+              <a:rPr lang="en-US" dirty="0"/>
+              <a:t>Don’t buy any book, but would be useful if you have access to any of these:</a:t>
+            </a:r>
+          </a:p>
+          <a:p>
+            <a:r>
+              <a:rPr lang="en-US" dirty="0"/>
+              <a:t>“Programming Language Pragmatics”, by Michael L. Scott, 4</a:t>
+            </a:r>
+            <a:r>
+              <a:rPr lang="en-US" baseline="30000" dirty="0"/>
+              <a:t>th</a:t>
+            </a:r>
+            <a:r>
+              <a:rPr lang="en-US" dirty="0"/>
+              <a:t> edition</a:t>
+            </a:r>
+          </a:p>
+          <a:p>
+            <a:r>
+              <a:rPr lang="en-US" dirty="0"/>
+              <a:t>“Compilers: Principles, Techniques and Tools”, by </a:t>
+            </a:r>
+            <a:r>
+              <a:rPr lang="en-US" dirty="0" err="1"/>
+              <a:t>Aho</a:t>
+            </a:r>
+            <a:r>
+              <a:rPr lang="en-US" dirty="0"/>
+              <a:t>, </a:t>
+            </a:r>
+            <a:r>
+              <a:rPr lang="en-US" dirty="0" err="1"/>
+              <a:t>Sethi</a:t>
+            </a:r>
+            <a:r>
+              <a:rPr lang="en-US" dirty="0"/>
+              <a:t> and Ullman (1986) or by </a:t>
+            </a:r>
+            <a:r>
+              <a:rPr lang="en-US" dirty="0" err="1"/>
+              <a:t>Aho</a:t>
+            </a:r>
+            <a:r>
+              <a:rPr lang="en-US" dirty="0"/>
+              <a:t>, Lam, </a:t>
+            </a:r>
+            <a:r>
+              <a:rPr lang="en-US" dirty="0" err="1"/>
+              <a:t>Sethi</a:t>
+            </a:r>
+            <a:r>
+              <a:rPr lang="en-US" dirty="0"/>
+              <a:t> and Ulman (2006)</a:t>
+            </a:r>
+          </a:p>
+          <a:p>
+            <a:r>
+              <a:rPr lang="en-US" dirty="0"/>
+              <a:t>“Engineering: A Compiler”, Cooper and </a:t>
+            </a:r>
+            <a:r>
+              <a:rPr lang="en-US" dirty="0" err="1"/>
+              <a:t>Torczon</a:t>
+            </a:r>
+            <a:endParaRPr lang="en-US" b="1" dirty="0"/>
+          </a:p>
+          <a:p>
+            <a:pPr marL="0" indent="0">
+              <a:buNone/>
+            </a:pPr>
+            <a:endParaRPr lang="en-US" dirty="0"/>
+          </a:p>
+          <a:p>
+            <a:pPr marL="0" indent="0">
+              <a:buNone/>
+            </a:pPr>
+            <a:r>
+              <a:rPr lang="en-US" dirty="0"/>
+              <a:t>Any of the above books will do</a:t>
+            </a:r>
+          </a:p>
+          <a:p>
+            <a:pPr marL="0" indent="0">
+              <a:buNone/>
+            </a:pPr>
+            <a:r>
+              <a:rPr lang="en-US" dirty="0"/>
+              <a:t>I will try to upload the slides before each corresponding class; sometimes up to the night before</a:t>
+            </a:r>
+          </a:p>
+        </p:txBody>
+      </p:sp>
+      <p:sp>
+        <p:nvSpPr>
+          <p:cNvPr id="4" name="Footer Placeholder 3">
+            <a:extLst>
+              <a:ext uri="{FF2B5EF4-FFF2-40B4-BE49-F238E27FC236}">
+                <a16:creationId xmlns:a16="http://schemas.microsoft.com/office/drawing/2014/main" id="{6CCEF927-D631-FF4B-91A1-F6DA5935BAB0}"/>
+              </a:ext>
+            </a:extLst>
+          </p:cNvPr>
+          <p:cNvSpPr>
+            <a:spLocks noGrp="1"/>
+          </p:cNvSpPr>
+          <p:nvPr>
+            <p:ph type="ftr" sz="quarter" idx="11"/>
+          </p:nvPr>
+        </p:nvSpPr>
+        <p:spPr/>
+        <p:txBody>
+          <a:bodyPr/>
+          <a:lstStyle/>
+          <a:p>
+            <a:r>
+              <a:rPr lang="en-US"/>
+              <a:t>Principles of Programming Languages</a:t>
+            </a:r>
+          </a:p>
+        </p:txBody>
+      </p:sp>
+      <p:sp>
+        <p:nvSpPr>
+          <p:cNvPr id="5" name="Slide Number Placeholder 4">
+            <a:extLst>
+              <a:ext uri="{FF2B5EF4-FFF2-40B4-BE49-F238E27FC236}">
+                <a16:creationId xmlns:a16="http://schemas.microsoft.com/office/drawing/2014/main" id="{149A53D0-7E6F-7249-A369-A2BCC1F884B1}"/>
+              </a:ext>
+            </a:extLst>
+          </p:cNvPr>
+          <p:cNvSpPr>
+            <a:spLocks noGrp="1"/>
+          </p:cNvSpPr>
+          <p:nvPr>
+            <p:ph type="sldNum" sz="quarter" idx="12"/>
+          </p:nvPr>
+        </p:nvSpPr>
+        <p:spPr/>
+        <p:txBody>
+          <a:bodyPr/>
+          <a:lstStyle/>
+          <a:p>
+            <a:fld id="{5BE6834E-C558-0A46-B29B-8DEF3296AFA8}" type="slidenum">
+              <a:rPr lang="en-US" smtClean="0"/>
+              <a:t>13</a:t>
+            </a:fld>
+            <a:endParaRPr lang="en-US"/>
+          </a:p>
+        </p:txBody>
+      </p:sp>
+    </p:spTree>
+    <p:extLst>
+      <p:ext uri="{BB962C8B-B14F-4D97-AF65-F5344CB8AC3E}">
+        <p14:creationId xmlns:p14="http://schemas.microsoft.com/office/powerpoint/2010/main" val="1187641740"/>
+      </p:ext>
+    </p:extLst>
+  </p:cSld>
+  <p:clrMapOvr>
+    <a:masterClrMapping/>
+  </p:clrMapOvr>
+</p:sld>
+</file>
+
+<file path=ppt/slides/slide14.xml><?xml version="1.0" encoding="utf-8"?>
+<p:sld xmlns:a="http://schemas.openxmlformats.org/drawingml/2006/main" xmlns:r="http://schemas.openxmlformats.org/officeDocument/2006/relationships" xmlns:p="http://schemas.openxmlformats.org/presentationml/2006/main">
+  <p:cSld>
+    <p:spTree>
+      <p:nvGrpSpPr>
+        <p:cNvPr id="1" name=""/>
+        <p:cNvGrpSpPr/>
+        <p:nvPr/>
+      </p:nvGrpSpPr>
+      <p:grpSpPr>
+        <a:xfrm>
+          <a:off x="0" y="0"/>
+          <a:ext cx="0" cy="0"/>
+          <a:chOff x="0" y="0"/>
+          <a:chExt cx="0" cy="0"/>
+        </a:xfrm>
+      </p:grpSpPr>
+      <p:sp>
+        <p:nvSpPr>
+          <p:cNvPr id="2" name="Title 1">
+            <a:extLst>
+              <a:ext uri="{FF2B5EF4-FFF2-40B4-BE49-F238E27FC236}">
                 <a16:creationId xmlns:a16="http://schemas.microsoft.com/office/drawing/2014/main" id="{0E11F760-4505-424F-82B4-CBF0452D07F1}"/>
               </a:ext>
             </a:extLst>
@@ -4630,7 +4840,7 @@
           <a:p>
             <a:fld id="{5BE6834E-C558-0A46-B29B-8DEF3296AFA8}" type="slidenum">
               <a:rPr lang="en-US" smtClean="0"/>
-              <a:t>13</a:t>
+              <a:t>14</a:t>
             </a:fld>
             <a:endParaRPr lang="en-US"/>
           </a:p>
@@ -4766,167 +4976,6 @@
 </p:sld>
 </file>
 
-<file path=ppt/slides/slide14.xml><?xml version="1.0" encoding="utf-8"?>
-<p:sld xmlns:a="http://schemas.openxmlformats.org/drawingml/2006/main" xmlns:r="http://schemas.openxmlformats.org/officeDocument/2006/relationships" xmlns:p="http://schemas.openxmlformats.org/presentationml/2006/main">
-  <p:cSld>
-    <p:spTree>
-      <p:nvGrpSpPr>
-        <p:cNvPr id="1" name=""/>
-        <p:cNvGrpSpPr/>
-        <p:nvPr/>
-      </p:nvGrpSpPr>
-      <p:grpSpPr>
-        <a:xfrm>
-          <a:off x="0" y="0"/>
-          <a:ext cx="0" cy="0"/>
-          <a:chOff x="0" y="0"/>
-          <a:chExt cx="0" cy="0"/>
-        </a:xfrm>
-      </p:grpSpPr>
-      <p:sp>
-        <p:nvSpPr>
-          <p:cNvPr id="2" name="Title 1">
-            <a:extLst>
-              <a:ext uri="{FF2B5EF4-FFF2-40B4-BE49-F238E27FC236}">
-                <a16:creationId xmlns:a16="http://schemas.microsoft.com/office/drawing/2014/main" id="{9460B25B-F24B-CA4D-A4A3-69F5B6DC305D}"/>
-              </a:ext>
-            </a:extLst>
-          </p:cNvPr>
-          <p:cNvSpPr>
-            <a:spLocks noGrp="1"/>
-          </p:cNvSpPr>
-          <p:nvPr>
-            <p:ph type="title"/>
-          </p:nvPr>
-        </p:nvSpPr>
-        <p:spPr/>
-        <p:txBody>
-          <a:bodyPr/>
-          <a:lstStyle/>
-          <a:p>
-            <a:r>
-              <a:rPr lang="en-US" dirty="0"/>
-              <a:t>Other</a:t>
-            </a:r>
-          </a:p>
-        </p:txBody>
-      </p:sp>
-      <p:sp>
-        <p:nvSpPr>
-          <p:cNvPr id="3" name="Content Placeholder 2">
-            <a:extLst>
-              <a:ext uri="{FF2B5EF4-FFF2-40B4-BE49-F238E27FC236}">
-                <a16:creationId xmlns:a16="http://schemas.microsoft.com/office/drawing/2014/main" id="{0BFEB765-DEE3-274A-93AB-C7E10DF05DFB}"/>
-              </a:ext>
-            </a:extLst>
-          </p:cNvPr>
-          <p:cNvSpPr>
-            <a:spLocks noGrp="1"/>
-          </p:cNvSpPr>
-          <p:nvPr>
-            <p:ph idx="1"/>
-          </p:nvPr>
-        </p:nvSpPr>
-        <p:spPr/>
-        <p:txBody>
-          <a:bodyPr/>
-          <a:lstStyle/>
-          <a:p>
-            <a:r>
-              <a:rPr lang="en-US" dirty="0"/>
-              <a:t>Please be respectful</a:t>
-            </a:r>
-          </a:p>
-          <a:p>
-            <a:r>
-              <a:rPr lang="en-US" dirty="0"/>
-              <a:t>Please avoid leaving classroom in the middle of the class: it disrupts the class</a:t>
-            </a:r>
-          </a:p>
-          <a:p>
-            <a:r>
-              <a:rPr lang="en-US" dirty="0"/>
-              <a:t>Please avoid taking phone / video calls</a:t>
-            </a:r>
-          </a:p>
-          <a:p>
-            <a:r>
-              <a:rPr lang="en-US" dirty="0"/>
-              <a:t>Feel free to use your laptop</a:t>
-            </a:r>
-          </a:p>
-        </p:txBody>
-      </p:sp>
-      <p:sp>
-        <p:nvSpPr>
-          <p:cNvPr id="4" name="Footer Placeholder 3">
-            <a:extLst>
-              <a:ext uri="{FF2B5EF4-FFF2-40B4-BE49-F238E27FC236}">
-                <a16:creationId xmlns:a16="http://schemas.microsoft.com/office/drawing/2014/main" id="{A168590A-B5EE-8B4D-B0F3-60484F41CF64}"/>
-              </a:ext>
-            </a:extLst>
-          </p:cNvPr>
-          <p:cNvSpPr>
-            <a:spLocks noGrp="1"/>
-          </p:cNvSpPr>
-          <p:nvPr>
-            <p:ph type="ftr" sz="quarter" idx="11"/>
-          </p:nvPr>
-        </p:nvSpPr>
-        <p:spPr/>
-        <p:txBody>
-          <a:bodyPr/>
-          <a:lstStyle/>
-          <a:p>
-            <a:r>
-              <a:rPr lang="en-US"/>
-              <a:t>Principles of Programming Languages</a:t>
-            </a:r>
-          </a:p>
-        </p:txBody>
-      </p:sp>
-      <p:sp>
-        <p:nvSpPr>
-          <p:cNvPr id="5" name="Slide Number Placeholder 4">
-            <a:extLst>
-              <a:ext uri="{FF2B5EF4-FFF2-40B4-BE49-F238E27FC236}">
-                <a16:creationId xmlns:a16="http://schemas.microsoft.com/office/drawing/2014/main" id="{02DC49D8-2E4B-2446-8692-D142238E606C}"/>
-              </a:ext>
-            </a:extLst>
-          </p:cNvPr>
-          <p:cNvSpPr>
-            <a:spLocks noGrp="1"/>
-          </p:cNvSpPr>
-          <p:nvPr>
-            <p:ph type="sldNum" sz="quarter" idx="12"/>
-          </p:nvPr>
-        </p:nvSpPr>
-        <p:spPr/>
-        <p:txBody>
-          <a:bodyPr/>
-          <a:lstStyle/>
-          <a:p>
-            <a:fld id="{5BE6834E-C558-0A46-B29B-8DEF3296AFA8}" type="slidenum">
-              <a:rPr lang="en-US" smtClean="0"/>
-              <a:t>14</a:t>
-            </a:fld>
-            <a:endParaRPr lang="en-US"/>
-          </a:p>
-        </p:txBody>
-      </p:sp>
-    </p:spTree>
-    <p:extLst>
-      <p:ext uri="{BB962C8B-B14F-4D97-AF65-F5344CB8AC3E}">
-        <p14:creationId xmlns:p14="http://schemas.microsoft.com/office/powerpoint/2010/main" val="4233885510"/>
-      </p:ext>
-    </p:extLst>
-  </p:cSld>
-  <p:clrMapOvr>
-    <a:masterClrMapping/>
-  </p:clrMapOvr>
-</p:sld>
-</file>
-
 <file path=ppt/slides/slide15.xml><?xml version="1.0" encoding="utf-8"?>
 <p:sld xmlns:a="http://schemas.openxmlformats.org/drawingml/2006/main" xmlns:r="http://schemas.openxmlformats.org/officeDocument/2006/relationships" xmlns:p="http://schemas.openxmlformats.org/presentationml/2006/main">
   <p:cSld>
@@ -4949,7 +4998,7 @@
           <p:cNvPr id="2" name="Title 1">
             <a:extLst>
               <a:ext uri="{FF2B5EF4-FFF2-40B4-BE49-F238E27FC236}">
-                <a16:creationId xmlns:a16="http://schemas.microsoft.com/office/drawing/2014/main" id="{3988425F-ABAC-3049-A2E9-469AE4741E0E}"/>
+                <a16:creationId xmlns:a16="http://schemas.microsoft.com/office/drawing/2014/main" id="{9460B25B-F24B-CA4D-A4A3-69F5B6DC305D}"/>
               </a:ext>
             </a:extLst>
           </p:cNvPr>
@@ -4967,7 +5016,7 @@
           <a:p>
             <a:r>
               <a:rPr lang="en-US" dirty="0"/>
-              <a:t>Questions?</a:t>
+              <a:t>Other</a:t>
             </a:r>
           </a:p>
         </p:txBody>
@@ -4977,7 +5026,7 @@
           <p:cNvPr id="3" name="Content Placeholder 2">
             <a:extLst>
               <a:ext uri="{FF2B5EF4-FFF2-40B4-BE49-F238E27FC236}">
-                <a16:creationId xmlns:a16="http://schemas.microsoft.com/office/drawing/2014/main" id="{BE3A2864-8C97-9C49-9255-835CC1B97CE0}"/>
+                <a16:creationId xmlns:a16="http://schemas.microsoft.com/office/drawing/2014/main" id="{0BFEB765-DEE3-274A-93AB-C7E10DF05DFB}"/>
               </a:ext>
             </a:extLst>
           </p:cNvPr>
@@ -4988,12 +5037,70 @@
             <p:ph idx="1"/>
           </p:nvPr>
         </p:nvSpPr>
-        <p:spPr/>
-        <p:txBody>
-          <a:bodyPr/>
-          <a:lstStyle/>
-          <a:p>
-            <a:endParaRPr lang="en-US"/>
+        <p:spPr>
+          <a:xfrm>
+            <a:off x="631371" y="1825625"/>
+            <a:ext cx="11136086" cy="4351338"/>
+          </a:xfrm>
+        </p:spPr>
+        <p:txBody>
+          <a:bodyPr>
+            <a:normAutofit fontScale="92500" lnSpcReduction="10000"/>
+          </a:bodyPr>
+          <a:lstStyle/>
+          <a:p>
+            <a:r>
+              <a:rPr lang="en-US" dirty="0"/>
+              <a:t>Please be respectful</a:t>
+            </a:r>
+          </a:p>
+          <a:p>
+            <a:r>
+              <a:rPr lang="en-US" dirty="0"/>
+              <a:t>Please avoid leaving classroom in the middle of the class: it disrupts the class</a:t>
+            </a:r>
+          </a:p>
+          <a:p>
+            <a:r>
+              <a:rPr lang="en-US" dirty="0"/>
+              <a:t>Please avoid taking phone / video calls</a:t>
+            </a:r>
+          </a:p>
+          <a:p>
+            <a:r>
+              <a:rPr lang="en-US" dirty="0"/>
+              <a:t>Feel free to use your laptop</a:t>
+            </a:r>
+          </a:p>
+          <a:p>
+            <a:r>
+              <a:rPr lang="en-US" dirty="0"/>
+              <a:t>Always wear mask in classroom</a:t>
+            </a:r>
+          </a:p>
+          <a:p>
+            <a:r>
+              <a:rPr lang="en-US" dirty="0"/>
+              <a:t>Keep your distance</a:t>
+            </a:r>
+          </a:p>
+          <a:p>
+            <a:r>
+              <a:rPr lang="en-US" dirty="0"/>
+              <a:t>Usable seats in classroom are marked.</a:t>
+            </a:r>
+          </a:p>
+          <a:p>
+            <a:r>
+              <a:rPr lang="en-US" dirty="0"/>
+              <a:t>No eating or drinking in class (for safety).</a:t>
+            </a:r>
+          </a:p>
+          <a:p>
+            <a:r>
+              <a:rPr lang="en-US" dirty="0"/>
+              <a:t>If you come to class, I suggest always cleaning the surface you occupy (table/chairs).</a:t>
+            </a:r>
           </a:p>
         </p:txBody>
       </p:sp>
@@ -5002,7 +5109,7 @@
           <p:cNvPr id="4" name="Footer Placeholder 3">
             <a:extLst>
               <a:ext uri="{FF2B5EF4-FFF2-40B4-BE49-F238E27FC236}">
-                <a16:creationId xmlns:a16="http://schemas.microsoft.com/office/drawing/2014/main" id="{07C79833-59FE-894A-B05F-47F39D9E3EB4}"/>
+                <a16:creationId xmlns:a16="http://schemas.microsoft.com/office/drawing/2014/main" id="{A168590A-B5EE-8B4D-B0F3-60484F41CF64}"/>
               </a:ext>
             </a:extLst>
           </p:cNvPr>
@@ -5030,7 +5137,7 @@
           <p:cNvPr id="5" name="Slide Number Placeholder 4">
             <a:extLst>
               <a:ext uri="{FF2B5EF4-FFF2-40B4-BE49-F238E27FC236}">
-                <a16:creationId xmlns:a16="http://schemas.microsoft.com/office/drawing/2014/main" id="{73F01FD9-6E7E-744C-8E18-EF056B28C1E6}"/>
+                <a16:creationId xmlns:a16="http://schemas.microsoft.com/office/drawing/2014/main" id="{02DC49D8-2E4B-2446-8692-D142238E606C}"/>
               </a:ext>
             </a:extLst>
           </p:cNvPr>
@@ -5049,6 +5156,146 @@
             <a:fld id="{5BE6834E-C558-0A46-B29B-8DEF3296AFA8}" type="slidenum">
               <a:rPr lang="en-US" smtClean="0"/>
               <a:t>15</a:t>
+            </a:fld>
+            <a:endParaRPr lang="en-US"/>
+          </a:p>
+        </p:txBody>
+      </p:sp>
+    </p:spTree>
+    <p:extLst>
+      <p:ext uri="{BB962C8B-B14F-4D97-AF65-F5344CB8AC3E}">
+        <p14:creationId xmlns:p14="http://schemas.microsoft.com/office/powerpoint/2010/main" val="4233885510"/>
+      </p:ext>
+    </p:extLst>
+  </p:cSld>
+  <p:clrMapOvr>
+    <a:masterClrMapping/>
+  </p:clrMapOvr>
+</p:sld>
+</file>
+
+<file path=ppt/slides/slide16.xml><?xml version="1.0" encoding="utf-8"?>
+<p:sld xmlns:a="http://schemas.openxmlformats.org/drawingml/2006/main" xmlns:r="http://schemas.openxmlformats.org/officeDocument/2006/relationships" xmlns:p="http://schemas.openxmlformats.org/presentationml/2006/main">
+  <p:cSld>
+    <p:spTree>
+      <p:nvGrpSpPr>
+        <p:cNvPr id="1" name=""/>
+        <p:cNvGrpSpPr/>
+        <p:nvPr/>
+      </p:nvGrpSpPr>
+      <p:grpSpPr>
+        <a:xfrm>
+          <a:off x="0" y="0"/>
+          <a:ext cx="0" cy="0"/>
+          <a:chOff x="0" y="0"/>
+          <a:chExt cx="0" cy="0"/>
+        </a:xfrm>
+      </p:grpSpPr>
+      <p:sp>
+        <p:nvSpPr>
+          <p:cNvPr id="2" name="Title 1">
+            <a:extLst>
+              <a:ext uri="{FF2B5EF4-FFF2-40B4-BE49-F238E27FC236}">
+                <a16:creationId xmlns:a16="http://schemas.microsoft.com/office/drawing/2014/main" id="{3988425F-ABAC-3049-A2E9-469AE4741E0E}"/>
+              </a:ext>
+            </a:extLst>
+          </p:cNvPr>
+          <p:cNvSpPr>
+            <a:spLocks noGrp="1"/>
+          </p:cNvSpPr>
+          <p:nvPr>
+            <p:ph type="title"/>
+          </p:nvPr>
+        </p:nvSpPr>
+        <p:spPr/>
+        <p:txBody>
+          <a:bodyPr/>
+          <a:lstStyle/>
+          <a:p>
+            <a:r>
+              <a:rPr lang="en-US" dirty="0"/>
+              <a:t>Questions?</a:t>
+            </a:r>
+          </a:p>
+        </p:txBody>
+      </p:sp>
+      <p:sp>
+        <p:nvSpPr>
+          <p:cNvPr id="3" name="Content Placeholder 2">
+            <a:extLst>
+              <a:ext uri="{FF2B5EF4-FFF2-40B4-BE49-F238E27FC236}">
+                <a16:creationId xmlns:a16="http://schemas.microsoft.com/office/drawing/2014/main" id="{BE3A2864-8C97-9C49-9255-835CC1B97CE0}"/>
+              </a:ext>
+            </a:extLst>
+          </p:cNvPr>
+          <p:cNvSpPr>
+            <a:spLocks noGrp="1"/>
+          </p:cNvSpPr>
+          <p:nvPr>
+            <p:ph idx="1"/>
+          </p:nvPr>
+        </p:nvSpPr>
+        <p:spPr/>
+        <p:txBody>
+          <a:bodyPr/>
+          <a:lstStyle/>
+          <a:p>
+            <a:endParaRPr lang="en-US"/>
+          </a:p>
+        </p:txBody>
+      </p:sp>
+      <p:sp>
+        <p:nvSpPr>
+          <p:cNvPr id="4" name="Footer Placeholder 3">
+            <a:extLst>
+              <a:ext uri="{FF2B5EF4-FFF2-40B4-BE49-F238E27FC236}">
+                <a16:creationId xmlns:a16="http://schemas.microsoft.com/office/drawing/2014/main" id="{07C79833-59FE-894A-B05F-47F39D9E3EB4}"/>
+              </a:ext>
+            </a:extLst>
+          </p:cNvPr>
+          <p:cNvSpPr>
+            <a:spLocks noGrp="1"/>
+          </p:cNvSpPr>
+          <p:nvPr>
+            <p:ph type="ftr" sz="quarter" idx="11"/>
+          </p:nvPr>
+        </p:nvSpPr>
+        <p:spPr/>
+        <p:txBody>
+          <a:bodyPr/>
+          <a:lstStyle/>
+          <a:p>
+            <a:r>
+              <a:rPr lang="en-US"/>
+              <a:t>Principles of Programming Languages</a:t>
+            </a:r>
+          </a:p>
+        </p:txBody>
+      </p:sp>
+      <p:sp>
+        <p:nvSpPr>
+          <p:cNvPr id="5" name="Slide Number Placeholder 4">
+            <a:extLst>
+              <a:ext uri="{FF2B5EF4-FFF2-40B4-BE49-F238E27FC236}">
+                <a16:creationId xmlns:a16="http://schemas.microsoft.com/office/drawing/2014/main" id="{73F01FD9-6E7E-744C-8E18-EF056B28C1E6}"/>
+              </a:ext>
+            </a:extLst>
+          </p:cNvPr>
+          <p:cNvSpPr>
+            <a:spLocks noGrp="1"/>
+          </p:cNvSpPr>
+          <p:nvPr>
+            <p:ph type="sldNum" sz="quarter" idx="12"/>
+          </p:nvPr>
+        </p:nvSpPr>
+        <p:spPr/>
+        <p:txBody>
+          <a:bodyPr/>
+          <a:lstStyle/>
+          <a:p>
+            <a:fld id="{5BE6834E-C558-0A46-B29B-8DEF3296AFA8}" type="slidenum">
+              <a:rPr lang="en-US" smtClean="0"/>
+              <a:t>16</a:t>
             </a:fld>
             <a:endParaRPr lang="en-US"/>
           </a:p>
@@ -5130,19 +5377,19 @@
         </p:nvSpPr>
         <p:spPr>
           <a:xfrm>
-            <a:off x="838200" y="1617890"/>
-            <a:ext cx="10515600" cy="4351338"/>
+            <a:off x="566057" y="1617889"/>
+            <a:ext cx="11179629" cy="4358367"/>
           </a:xfrm>
         </p:spPr>
         <p:txBody>
           <a:bodyPr>
-            <a:normAutofit fontScale="92500" lnSpcReduction="20000"/>
+            <a:normAutofit fontScale="85000" lnSpcReduction="20000"/>
           </a:bodyPr>
           <a:lstStyle/>
           <a:p>
             <a:r>
               <a:rPr lang="en-US" dirty="0"/>
-              <a:t>Name: Martin Kong</a:t>
+              <a:t>Strongly preferred name: Martin Kong</a:t>
             </a:r>
           </a:p>
           <a:p>
@@ -5160,13 +5407,19 @@
           <a:p>
             <a:r>
               <a:rPr lang="en-US" dirty="0"/>
-              <a:t>Class hours: M W, 3pm – 4:15pm</a:t>
-            </a:r>
-          </a:p>
-          <a:p>
-            <a:r>
-              <a:rPr lang="en-US" dirty="0"/>
-              <a:t>Office hours: DEH 230, M W, 11am – 12:30pm</a:t>
+              <a:t>Being at OU for a year now. </a:t>
+            </a:r>
+          </a:p>
+          <a:p>
+            <a:r>
+              <a:rPr lang="en-US" dirty="0"/>
+              <a:t>Class hours: M W F, 9:45am – 10:35am.</a:t>
+            </a:r>
+          </a:p>
+          <a:p>
+            <a:r>
+              <a:rPr lang="en-US" dirty="0"/>
+              <a:t>Office hours: via Zoom – see announcement in Canvas.</a:t>
             </a:r>
           </a:p>
           <a:p>
@@ -5352,7 +5605,7 @@
               <a:rPr lang="en-US" dirty="0">
                 <a:sym typeface="Wingdings" pitchFamily="2" charset="2"/>
               </a:rPr>
-              <a:t></a:t>
+              <a:t>  </a:t>
             </a:r>
           </a:p>
           <a:p>
@@ -5370,7 +5623,7 @@
           <a:p>
             <a:r>
               <a:rPr lang="en-US" dirty="0"/>
-              <a:t>I hope to have two of them</a:t>
+              <a:t>I hope to have one of them</a:t>
             </a:r>
           </a:p>
           <a:p>
@@ -5498,7 +5751,7 @@
           <a:p>
             <a:r>
               <a:rPr lang="en-US" dirty="0"/>
-              <a:t>Dates</a:t>
+              <a:t>Some Important Dates</a:t>
             </a:r>
           </a:p>
         </p:txBody>
@@ -5526,61 +5779,11 @@
           </a:bodyPr>
           <a:lstStyle/>
           <a:p>
-            <a:r>
-              <a:rPr lang="en-US" dirty="0"/>
-              <a:t>First class: January 13th</a:t>
-            </a:r>
-          </a:p>
-          <a:p>
-            <a:r>
-              <a:rPr lang="en-US" dirty="0">
-                <a:highlight>
-                  <a:srgbClr val="00FF00"/>
-                </a:highlight>
-              </a:rPr>
-              <a:t>January 20</a:t>
-            </a:r>
-            <a:r>
-              <a:rPr lang="en-US" baseline="30000" dirty="0">
-                <a:highlight>
-                  <a:srgbClr val="00FF00"/>
-                </a:highlight>
-              </a:rPr>
-              <a:t>th</a:t>
-            </a:r>
-            <a:r>
-              <a:rPr lang="en-US" dirty="0">
-                <a:highlight>
-                  <a:srgbClr val="00FF00"/>
-                </a:highlight>
-              </a:rPr>
-              <a:t> (Martin Luther King Day): holiday</a:t>
-            </a:r>
-          </a:p>
-          <a:p>
-            <a:r>
-              <a:rPr lang="en-US" dirty="0"/>
-              <a:t>February 17</a:t>
-            </a:r>
-            <a:r>
-              <a:rPr lang="en-US" baseline="30000" dirty="0"/>
-              <a:t>th</a:t>
-            </a:r>
-            <a:r>
-              <a:rPr lang="en-US" dirty="0"/>
-              <a:t> (Presidents’ Day): Not Holiday (My bad) </a:t>
-            </a:r>
-          </a:p>
-          <a:p>
-            <a:r>
-              <a:rPr lang="en-US" dirty="0"/>
-              <a:t>Midterm review: March 2</a:t>
-            </a:r>
-            <a:r>
-              <a:rPr lang="en-US" baseline="30000" dirty="0"/>
-              <a:t>nd</a:t>
-            </a:r>
-            <a:endParaRPr lang="en-US" dirty="0"/>
+            <a:endParaRPr lang="en-US" dirty="0">
+              <a:solidFill>
+                <a:srgbClr val="FF0000"/>
+              </a:solidFill>
+            </a:endParaRPr>
           </a:p>
           <a:p>
             <a:r>
@@ -5589,7 +5792,7 @@
                   <a:srgbClr val="FF0000"/>
                 </a:solidFill>
               </a:rPr>
-              <a:t>Midterm: March 4</a:t>
+              <a:t>Midterm: October 7</a:t>
             </a:r>
             <a:r>
               <a:rPr lang="en-US" baseline="30000" dirty="0">
@@ -5599,6 +5802,38 @@
               </a:rPr>
               <a:t>th</a:t>
             </a:r>
+            <a:r>
+              <a:rPr lang="en-US" dirty="0">
+                <a:solidFill>
+                  <a:srgbClr val="FF0000"/>
+                </a:solidFill>
+              </a:rPr>
+              <a:t> or October 14</a:t>
+            </a:r>
+            <a:r>
+              <a:rPr lang="en-US" baseline="30000" dirty="0">
+                <a:solidFill>
+                  <a:srgbClr val="FF0000"/>
+                </a:solidFill>
+              </a:rPr>
+              <a:t>th </a:t>
+            </a:r>
+            <a:r>
+              <a:rPr lang="en-US" dirty="0">
+                <a:solidFill>
+                  <a:srgbClr val="FF0000"/>
+                </a:solidFill>
+              </a:rPr>
+              <a:t>or October 21</a:t>
+            </a:r>
+            <a:r>
+              <a:rPr lang="en-US" baseline="30000" dirty="0">
+                <a:solidFill>
+                  <a:srgbClr val="FF0000"/>
+                </a:solidFill>
+              </a:rPr>
+              <a:t>st </a:t>
+            </a:r>
             <a:endParaRPr lang="en-US" dirty="0">
               <a:solidFill>
                 <a:srgbClr val="FF0000"/>
@@ -5607,55 +5842,8 @@
           </a:p>
           <a:p>
             <a:r>
-              <a:rPr lang="en-US" dirty="0">
-                <a:highlight>
-                  <a:srgbClr val="00FF00"/>
-                </a:highlight>
-              </a:rPr>
-              <a:t>Spring vacation: March 14</a:t>
-            </a:r>
-            <a:r>
-              <a:rPr lang="en-US" baseline="30000" dirty="0">
-                <a:highlight>
-                  <a:srgbClr val="00FF00"/>
-                </a:highlight>
-              </a:rPr>
-              <a:t>th</a:t>
-            </a:r>
-            <a:r>
-              <a:rPr lang="en-US" dirty="0">
-                <a:highlight>
-                  <a:srgbClr val="00FF00"/>
-                </a:highlight>
-              </a:rPr>
-              <a:t> – March 22</a:t>
-            </a:r>
-            <a:r>
-              <a:rPr lang="en-US" baseline="30000" dirty="0">
-                <a:highlight>
-                  <a:srgbClr val="00FF00"/>
-                </a:highlight>
-              </a:rPr>
-              <a:t>nd</a:t>
-            </a:r>
-            <a:endParaRPr lang="en-US" dirty="0">
-              <a:highlight>
-                <a:srgbClr val="00FF00"/>
-              </a:highlight>
-            </a:endParaRPr>
-          </a:p>
-          <a:p>
-            <a:r>
-              <a:rPr lang="en-US" dirty="0"/>
-              <a:t>Last class: April 29</a:t>
-            </a:r>
-            <a:r>
-              <a:rPr lang="en-US" baseline="30000" dirty="0"/>
-              <a:t>th</a:t>
-            </a:r>
-            <a:r>
-              <a:rPr lang="en-US" dirty="0"/>
-              <a:t> (Final Exam Review)</a:t>
+              <a:rPr lang="en-US" dirty="0"/>
+              <a:t>Last class: Dec 11 (Final Exam Review)</a:t>
             </a:r>
           </a:p>
           <a:p>
@@ -5665,7 +5853,7 @@
                   <a:srgbClr val="FF0000"/>
                 </a:solidFill>
               </a:rPr>
-              <a:t>Final Exam: May 6</a:t>
+              <a:t>Final Exam: Dec 15</a:t>
             </a:r>
             <a:r>
               <a:rPr lang="en-US" baseline="30000" dirty="0">
@@ -5681,7 +5869,7 @@
                   <a:srgbClr val="FF0000"/>
                 </a:solidFill>
               </a:rPr>
-              <a:t>, 4:30pm – 6:30pm </a:t>
+              <a:t>, 8am – 10am </a:t>
             </a:r>
           </a:p>
         </p:txBody>
@@ -5834,6 +6022,24 @@
             </a:r>
           </a:p>
           <a:p>
+            <a:r>
+              <a:rPr lang="en-US" dirty="0"/>
+              <a:t>Not mandatory. Course accessible via zoom live and recordings (See Canvas).</a:t>
+            </a:r>
+          </a:p>
+          <a:p>
+            <a:r>
+              <a:rPr lang="en-US" dirty="0"/>
+              <a:t>Encouraged to attend for quizzes.</a:t>
+            </a:r>
+          </a:p>
+          <a:p>
+            <a:r>
+              <a:rPr lang="en-US" dirty="0"/>
+              <a:t>Likely mandatory to attend for exams (midterm and final).</a:t>
+            </a:r>
+          </a:p>
+          <a:p>
             <a:endParaRPr lang="en-US" dirty="0"/>
           </a:p>
         </p:txBody>
@@ -5984,7 +6190,7 @@
           <a:p>
             <a:r>
               <a:rPr lang="en-US" dirty="0"/>
-              <a:t>Homework: 20%</a:t>
+              <a:t>Homework: 30%</a:t>
             </a:r>
           </a:p>
           <a:p>
@@ -5996,7 +6202,7 @@
           <a:p>
             <a:r>
               <a:rPr lang="en-US" dirty="0"/>
-              <a:t>Final Exam: 30%</a:t>
+              <a:t>Final Exam: 20%</a:t>
             </a:r>
           </a:p>
         </p:txBody>
@@ -6104,218 +6310,126 @@
             <p:ph type="title"/>
           </p:nvPr>
         </p:nvSpPr>
-        <p:spPr/>
-        <p:txBody>
-          <a:bodyPr/>
-          <a:lstStyle/>
-          <a:p>
-            <a:r>
-              <a:rPr lang="en-US" dirty="0"/>
-              <a:t>Quizzes</a:t>
-            </a:r>
-          </a:p>
-        </p:txBody>
-      </p:sp>
-      <p:sp>
-        <p:nvSpPr>
-          <p:cNvPr id="3" name="Content Placeholder 2">
-            <a:extLst>
-              <a:ext uri="{FF2B5EF4-FFF2-40B4-BE49-F238E27FC236}">
-                <a16:creationId xmlns:a16="http://schemas.microsoft.com/office/drawing/2014/main" id="{EC1C5E14-6DCC-434E-99FA-AD368AB9FC5E}"/>
-              </a:ext>
-            </a:extLst>
-          </p:cNvPr>
-          <p:cNvSpPr>
-            <a:spLocks noGrp="1"/>
-          </p:cNvSpPr>
-          <p:nvPr>
-            <p:ph idx="1"/>
-          </p:nvPr>
-        </p:nvSpPr>
         <p:spPr>
           <a:xfrm>
-            <a:off x="838200" y="1524000"/>
-            <a:ext cx="10515600" cy="4652963"/>
+            <a:off x="413657" y="136525"/>
+            <a:ext cx="10515600" cy="1325563"/>
           </a:xfrm>
         </p:spPr>
         <p:txBody>
+          <a:bodyPr/>
+          <a:lstStyle/>
+          <a:p>
+            <a:r>
+              <a:rPr lang="en-US" dirty="0"/>
+              <a:t>Quizzes</a:t>
+            </a:r>
+          </a:p>
+        </p:txBody>
+      </p:sp>
+      <p:sp>
+        <p:nvSpPr>
+          <p:cNvPr id="3" name="Content Placeholder 2">
+            <a:extLst>
+              <a:ext uri="{FF2B5EF4-FFF2-40B4-BE49-F238E27FC236}">
+                <a16:creationId xmlns:a16="http://schemas.microsoft.com/office/drawing/2014/main" id="{EC1C5E14-6DCC-434E-99FA-AD368AB9FC5E}"/>
+              </a:ext>
+            </a:extLst>
+          </p:cNvPr>
+          <p:cNvSpPr>
+            <a:spLocks noGrp="1"/>
+          </p:cNvSpPr>
+          <p:nvPr>
+            <p:ph idx="1"/>
+          </p:nvPr>
+        </p:nvSpPr>
+        <p:spPr>
+          <a:xfrm>
+            <a:off x="560614" y="1382486"/>
+            <a:ext cx="11070772" cy="4652963"/>
+          </a:xfrm>
+        </p:spPr>
+        <p:txBody>
           <a:bodyPr>
-            <a:normAutofit fontScale="77500" lnSpcReduction="20000"/>
+            <a:noAutofit/>
           </a:bodyPr>
           <a:lstStyle/>
           <a:p>
             <a:r>
-              <a:rPr lang="en-US" dirty="0"/>
-              <a:t>In class, online</a:t>
-            </a:r>
-          </a:p>
-          <a:p>
-            <a:r>
-              <a:rPr lang="en-US" dirty="0"/>
-              <a:t>Held at the beginning of the class</a:t>
-            </a:r>
-          </a:p>
-          <a:p>
-            <a:r>
-              <a:rPr lang="en-US" dirty="0"/>
-              <a:t>Lasts 15 minutes</a:t>
-            </a:r>
-          </a:p>
-          <a:p>
-            <a:r>
-              <a:rPr lang="en-US" dirty="0"/>
+              <a:rPr lang="en-US" sz="2000" dirty="0"/>
+              <a:t>Online. Held at the beginning of the class</a:t>
+            </a:r>
+          </a:p>
+          <a:p>
+            <a:r>
+              <a:rPr lang="en-US" sz="2000" dirty="0"/>
+              <a:t>Quizzes will start 5 minutes after start of class, and last 15 minutes</a:t>
+            </a:r>
+          </a:p>
+          <a:p>
+            <a:r>
+              <a:rPr lang="en-US" sz="2000" dirty="0">
+                <a:solidFill>
+                  <a:srgbClr val="FF0000"/>
+                </a:solidFill>
+              </a:rPr>
               <a:t>No make-up quizzes</a:t>
             </a:r>
           </a:p>
           <a:p>
             <a:r>
-              <a:rPr lang="en-US" dirty="0"/>
-              <a:t>If you arrive late, you only have whatever time remains</a:t>
-            </a:r>
-          </a:p>
-          <a:p>
-            <a:r>
-              <a:rPr lang="en-US" dirty="0"/>
-              <a:t>Quizzes will start 5 minutes after start of class</a:t>
-            </a:r>
-          </a:p>
-          <a:p>
-            <a:r>
-              <a:rPr lang="en-US" dirty="0"/>
+              <a:rPr lang="en-US" sz="2000" dirty="0"/>
+              <a:t>If you arrive/join late, you only have whatever time remains</a:t>
+            </a:r>
+          </a:p>
+          <a:p>
+            <a:r>
+              <a:rPr lang="en-US" sz="2000" dirty="0"/>
               <a:t>Open book</a:t>
             </a:r>
           </a:p>
           <a:p>
             <a:r>
-              <a:rPr lang="en-US" dirty="0"/>
-              <a:t>Quizzes with lowest two grades do not count towards final grade </a:t>
-            </a:r>
-          </a:p>
-          <a:p>
-            <a:r>
-              <a:rPr lang="en-US" dirty="0"/>
-              <a:t>Will have 8 (5+3) quizzes</a:t>
-            </a:r>
-          </a:p>
-          <a:p>
-            <a:r>
-              <a:rPr lang="en-US" dirty="0"/>
-              <a:t>Each quiz will be worth 5 pts; each question is all or nothing, no partial grade</a:t>
-            </a:r>
-          </a:p>
-          <a:p>
-            <a:r>
-              <a:rPr lang="en-US" dirty="0"/>
-              <a:t>Pre-midterm quizzes: January 27</a:t>
-            </a:r>
-            <a:r>
-              <a:rPr lang="en-US" baseline="30000" dirty="0"/>
-              <a:t>th</a:t>
-            </a:r>
-            <a:r>
-              <a:rPr lang="en-US" dirty="0"/>
-              <a:t>, </a:t>
-            </a:r>
-            <a:r>
-              <a:rPr lang="en-US" strike="sngStrike" dirty="0"/>
-              <a:t>February 3</a:t>
-            </a:r>
-            <a:r>
-              <a:rPr lang="en-US" strike="sngStrike" baseline="30000" dirty="0"/>
-              <a:t>rd</a:t>
-            </a:r>
-            <a:r>
-              <a:rPr lang="en-US" dirty="0"/>
-              <a:t>, February 10</a:t>
-            </a:r>
-            <a:r>
-              <a:rPr lang="en-US" baseline="30000" dirty="0"/>
-              <a:t>th</a:t>
-            </a:r>
-            <a:r>
-              <a:rPr lang="en-US" dirty="0"/>
-              <a:t>, February 19</a:t>
-            </a:r>
-            <a:r>
-              <a:rPr lang="en-US" baseline="30000" dirty="0"/>
-              <a:t>th</a:t>
-            </a:r>
-            <a:r>
-              <a:rPr lang="en-US" dirty="0"/>
-              <a:t>, February </a:t>
-            </a:r>
-            <a:r>
-              <a:rPr lang="en-US"/>
-              <a:t>26</a:t>
-            </a:r>
-            <a:r>
-              <a:rPr lang="en-US" baseline="30000"/>
-              <a:t>th</a:t>
-            </a:r>
-            <a:r>
-              <a:rPr lang="en-US"/>
-              <a:t> </a:t>
-            </a:r>
-            <a:endParaRPr lang="en-US" b="1" dirty="0">
+              <a:rPr lang="en-US" sz="2000" dirty="0"/>
+              <a:t>Quiz with lowest score does not count towards final grade </a:t>
+            </a:r>
+          </a:p>
+          <a:p>
+            <a:r>
+              <a:rPr lang="en-US" sz="2000" dirty="0"/>
+              <a:t>Will have 6 (3+3) quizzes</a:t>
+            </a:r>
+          </a:p>
+          <a:p>
+            <a:r>
+              <a:rPr lang="en-US" sz="2000" dirty="0"/>
+              <a:t>Each quiz will be worth 6 pts; most questions are all or nothing, no partial grade. Hard to control that in Canvas.</a:t>
+            </a:r>
+          </a:p>
+          <a:p>
+            <a:r>
+              <a:rPr lang="en-US" sz="2000" dirty="0"/>
+              <a:t>Tentative dates:</a:t>
+            </a:r>
+          </a:p>
+          <a:p>
+            <a:pPr lvl="1"/>
+            <a:r>
+              <a:rPr lang="en-US" sz="2000" dirty="0"/>
+              <a:t>Pre-midterm quizzes: September 16, September 30, October 7 (Unless we hold midterm this day).</a:t>
+            </a:r>
+            <a:endParaRPr lang="en-US" sz="2000" b="1" dirty="0">
               <a:solidFill>
                 <a:srgbClr val="FF0000"/>
               </a:solidFill>
             </a:endParaRPr>
           </a:p>
           <a:p>
-            <a:r>
-              <a:rPr lang="en-US" dirty="0"/>
-              <a:t>Post-midterm quizzes: </a:t>
-            </a:r>
-            <a:r>
-              <a:rPr lang="en-US" b="1" dirty="0">
-                <a:solidFill>
-                  <a:srgbClr val="FF0000"/>
-                </a:solidFill>
-              </a:rPr>
-              <a:t>March 9</a:t>
-            </a:r>
-            <a:r>
-              <a:rPr lang="en-US" b="1" baseline="30000" dirty="0">
-                <a:solidFill>
-                  <a:srgbClr val="FF0000"/>
-                </a:solidFill>
-              </a:rPr>
-              <a:t>th</a:t>
-            </a:r>
-            <a:r>
-              <a:rPr lang="en-US" b="1" dirty="0">
-                <a:solidFill>
-                  <a:srgbClr val="FF0000"/>
-                </a:solidFill>
-              </a:rPr>
-              <a:t> , </a:t>
-            </a:r>
-            <a:r>
-              <a:rPr lang="en-US" dirty="0"/>
-              <a:t>April 1</a:t>
-            </a:r>
-            <a:r>
-              <a:rPr lang="en-US" baseline="30000" dirty="0"/>
-              <a:t>st</a:t>
-            </a:r>
-            <a:r>
-              <a:rPr lang="en-US" dirty="0"/>
-              <a:t>, April 13</a:t>
-            </a:r>
-            <a:r>
-              <a:rPr lang="en-US" baseline="30000" dirty="0"/>
-              <a:t>th</a:t>
-            </a:r>
-            <a:r>
-              <a:rPr lang="en-US" dirty="0"/>
-              <a:t>, April 22</a:t>
-            </a:r>
-            <a:r>
-              <a:rPr lang="en-US" baseline="30000" dirty="0"/>
-              <a:t>nd</a:t>
-            </a:r>
-            <a:endParaRPr lang="en-US" dirty="0"/>
+            <a:pPr lvl="1"/>
+            <a:r>
+              <a:rPr lang="en-US" sz="2000" dirty="0"/>
+              <a:t>Post-midterm quizzes: October 28, November 11 and November 25.</a:t>
+            </a:r>
           </a:p>
         </p:txBody>
       </p:sp>
@@ -6429,7 +6543,7 @@
           <a:p>
             <a:r>
               <a:rPr lang="en-US" dirty="0"/>
-              <a:t>Homework</a:t>
+              <a:t>Programming Assignments</a:t>
             </a:r>
           </a:p>
         </p:txBody>
@@ -6450,10 +6564,15 @@
             <p:ph idx="1"/>
           </p:nvPr>
         </p:nvSpPr>
-        <p:spPr/>
+        <p:spPr>
+          <a:xfrm>
+            <a:off x="522514" y="1825625"/>
+            <a:ext cx="10831286" cy="4351338"/>
+          </a:xfrm>
+        </p:spPr>
         <p:txBody>
           <a:bodyPr>
-            <a:normAutofit lnSpcReduction="10000"/>
+            <a:normAutofit fontScale="92500" lnSpcReduction="20000"/>
           </a:bodyPr>
           <a:lstStyle/>
           <a:p>
@@ -6495,7 +6614,7 @@
           <a:p>
             <a:r>
               <a:rPr lang="en-US" dirty="0"/>
-              <a:t>All homework count towards your final grade</a:t>
+              <a:t>All assignments count towards your final grade</a:t>
             </a:r>
           </a:p>
           <a:p>
@@ -6507,7 +6626,13 @@
           <a:p>
             <a:r>
               <a:rPr lang="en-US" dirty="0"/>
-              <a:t>Each homework worth 5 points</a:t>
+              <a:t>Each homework worth 7.5 points</a:t>
+            </a:r>
+          </a:p>
+          <a:p>
+            <a:r>
+              <a:rPr lang="en-US" dirty="0"/>
+              <a:t>You can work in groups of up to three classmates.</a:t>
             </a:r>
           </a:p>
         </p:txBody>
@@ -6622,7 +6747,7 @@
           <a:p>
             <a:r>
               <a:rPr lang="en-US" dirty="0"/>
-              <a:t>Homework</a:t>
+              <a:t>Programming Assignments</a:t>
             </a:r>
           </a:p>
         </p:txBody>
@@ -6699,14 +6824,14 @@
           <p:nvPr>
             <p:extLst>
               <p:ext uri="{D42A27DB-BD31-4B8C-83A1-F6EECF244321}">
-                <p14:modId xmlns:p14="http://schemas.microsoft.com/office/powerpoint/2010/main" val="3708457921"/>
+                <p14:modId xmlns:p14="http://schemas.microsoft.com/office/powerpoint/2010/main" val="162571785"/>
               </p:ext>
             </p:extLst>
           </p:nvPr>
         </p:nvGraphicFramePr>
         <p:xfrm>
-          <a:off x="1447800" y="1690688"/>
-          <a:ext cx="8712201" cy="2796420"/>
+          <a:off x="729343" y="1690688"/>
+          <a:ext cx="10961916" cy="3323772"/>
         </p:xfrm>
         <a:graphic>
           <a:graphicData uri="http://schemas.openxmlformats.org/drawingml/2006/table">
@@ -6715,21 +6840,28 @@
                 <a:tableStyleId>{5C22544A-7EE6-4342-B048-85BDC9FD1C3A}</a:tableStyleId>
               </a:tblPr>
               <a:tblGrid>
-                <a:gridCol w="2904067">
+                <a:gridCol w="2133600">
                   <a:extLst>
                     <a:ext uri="{9D8B030D-6E8A-4147-A177-3AD203B41FA5}">
                       <a16:colId xmlns:a16="http://schemas.microsoft.com/office/drawing/2014/main" val="3558126180"/>
                     </a:ext>
                   </a:extLst>
                 </a:gridCol>
-                <a:gridCol w="2904067">
+                <a:gridCol w="3347358">
+                  <a:extLst>
+                    <a:ext uri="{9D8B030D-6E8A-4147-A177-3AD203B41FA5}">
+                      <a16:colId xmlns:a16="http://schemas.microsoft.com/office/drawing/2014/main" val="4090606475"/>
+                    </a:ext>
+                  </a:extLst>
+                </a:gridCol>
+                <a:gridCol w="2740479">
                   <a:extLst>
                     <a:ext uri="{9D8B030D-6E8A-4147-A177-3AD203B41FA5}">
                       <a16:colId xmlns:a16="http://schemas.microsoft.com/office/drawing/2014/main" val="1636752988"/>
                     </a:ext>
                   </a:extLst>
                 </a:gridCol>
-                <a:gridCol w="2904067">
+                <a:gridCol w="2740479">
                   <a:extLst>
                     <a:ext uri="{9D8B030D-6E8A-4147-A177-3AD203B41FA5}">
                       <a16:colId xmlns:a16="http://schemas.microsoft.com/office/drawing/2014/main" val="2923833230"/>
@@ -6744,7 +6876,7 @@
                     <a:lstStyle/>
                     <a:p>
                       <a:r>
-                        <a:rPr lang="en-US" sz="2800" dirty="0"/>
+                        <a:rPr lang="en-US" sz="2400" dirty="0"/>
                         <a:t>Homework</a:t>
                       </a:r>
                     </a:p>
@@ -6757,7 +6889,20 @@
                     <a:lstStyle/>
                     <a:p>
                       <a:r>
-                        <a:rPr lang="en-US" sz="2800" dirty="0"/>
+                        <a:rPr lang="en-US" sz="2400" dirty="0"/>
+                        <a:t>Description</a:t>
+                      </a:r>
+                    </a:p>
+                  </a:txBody>
+                  <a:tcPr/>
+                </a:tc>
+                <a:tc>
+                  <a:txBody>
+                    <a:bodyPr/>
+                    <a:lstStyle/>
+                    <a:p>
+                      <a:r>
+                        <a:rPr lang="en-US" sz="2400" dirty="0"/>
                         <a:t>Given Date</a:t>
                       </a:r>
                     </a:p>
@@ -6770,7 +6915,7 @@
                     <a:lstStyle/>
                     <a:p>
                       <a:r>
-                        <a:rPr lang="en-US" sz="2800" dirty="0"/>
+                        <a:rPr lang="en-US" sz="2400" dirty="0"/>
                         <a:t>Due Date</a:t>
                       </a:r>
                     </a:p>
@@ -6790,7 +6935,7 @@
                     <a:lstStyle/>
                     <a:p>
                       <a:r>
-                        <a:rPr lang="en-US" sz="2800" dirty="0"/>
+                        <a:rPr lang="en-US" sz="2400" dirty="0"/>
                         <a:t>#1</a:t>
                       </a:r>
                     </a:p>
@@ -6803,8 +6948,8 @@
                     <a:lstStyle/>
                     <a:p>
                       <a:r>
-                        <a:rPr lang="en-US" sz="2800" dirty="0"/>
-                        <a:t>Jan 22</a:t>
+                        <a:rPr lang="en-US" sz="2400" dirty="0"/>
+                        <a:t>Lexical Analyzer</a:t>
                       </a:r>
                     </a:p>
                   </a:txBody>
@@ -6816,8 +6961,21 @@
                     <a:lstStyle/>
                     <a:p>
                       <a:r>
-                        <a:rPr lang="en-US" sz="2800" dirty="0"/>
-                        <a:t>Feb 5</a:t>
+                        <a:rPr lang="en-US" sz="2400" dirty="0"/>
+                        <a:t>Sep 4</a:t>
+                      </a:r>
+                    </a:p>
+                  </a:txBody>
+                  <a:tcPr/>
+                </a:tc>
+                <a:tc>
+                  <a:txBody>
+                    <a:bodyPr/>
+                    <a:lstStyle/>
+                    <a:p>
+                      <a:r>
+                        <a:rPr lang="en-US" sz="2400" dirty="0"/>
+                        <a:t>Sep 16</a:t>
                       </a:r>
                     </a:p>
                   </a:txBody>
@@ -6836,7 +6994,7 @@
                     <a:lstStyle/>
                     <a:p>
                       <a:r>
-                        <a:rPr lang="en-US" sz="2800" dirty="0"/>
+                        <a:rPr lang="en-US" sz="2400" dirty="0"/>
                         <a:t>#2</a:t>
                       </a:r>
                     </a:p>
@@ -6848,9 +7006,26 @@
                     <a:bodyPr/>
                     <a:lstStyle/>
                     <a:p>
+                      <a:pPr marL="0" marR="0" lvl="0" indent="0" algn="l" defTabSz="914400" rtl="0" eaLnBrk="1" fontAlgn="auto" latinLnBrk="0" hangingPunct="1">
+                        <a:lnSpc>
+                          <a:spcPct val="100000"/>
+                        </a:lnSpc>
+                        <a:spcBef>
+                          <a:spcPts val="0"/>
+                        </a:spcBef>
+                        <a:spcAft>
+                          <a:spcPts val="0"/>
+                        </a:spcAft>
+                        <a:buClrTx/>
+                        <a:buSzTx/>
+                        <a:buFontTx/>
+                        <a:buNone/>
+                        <a:tabLst/>
+                        <a:defRPr/>
+                      </a:pPr>
                       <a:r>
-                        <a:rPr lang="en-US" sz="2800" dirty="0"/>
-                        <a:t>Feb 10</a:t>
+                        <a:rPr lang="en-US" sz="2400" dirty="0"/>
+                        <a:t>Syntax Analyzer</a:t>
                       </a:r>
                     </a:p>
                   </a:txBody>
@@ -6862,8 +7037,21 @@
                     <a:lstStyle/>
                     <a:p>
                       <a:r>
-                        <a:rPr lang="en-US" sz="2800" dirty="0"/>
-                        <a:t>Mar 2</a:t>
+                        <a:rPr lang="en-US" sz="2400" dirty="0"/>
+                        <a:t>Sep 16</a:t>
+                      </a:r>
+                    </a:p>
+                  </a:txBody>
+                  <a:tcPr/>
+                </a:tc>
+                <a:tc>
+                  <a:txBody>
+                    <a:bodyPr/>
+                    <a:lstStyle/>
+                    <a:p>
+                      <a:r>
+                        <a:rPr lang="en-US" sz="2400" dirty="0"/>
+                        <a:t>Oct 9</a:t>
                       </a:r>
                     </a:p>
                   </a:txBody>
@@ -6882,7 +7070,7 @@
                     <a:lstStyle/>
                     <a:p>
                       <a:r>
-                        <a:rPr lang="en-US" sz="2800" dirty="0"/>
+                        <a:rPr lang="en-US" sz="2400" dirty="0"/>
                         <a:t>#3</a:t>
                       </a:r>
                     </a:p>
@@ -6895,8 +7083,8 @@
                     <a:lstStyle/>
                     <a:p>
                       <a:r>
-                        <a:rPr lang="en-US" sz="2800" dirty="0"/>
-                        <a:t>Mar 9</a:t>
+                        <a:rPr lang="en-US" sz="2400" dirty="0"/>
+                        <a:t>Intermediate Code Generation – Part 1</a:t>
                       </a:r>
                     </a:p>
                   </a:txBody>
@@ -6908,8 +7096,21 @@
                     <a:lstStyle/>
                     <a:p>
                       <a:r>
-                        <a:rPr lang="en-US" sz="2800" dirty="0"/>
-                        <a:t>Apr 1</a:t>
+                        <a:rPr lang="en-US" sz="2400" dirty="0"/>
+                        <a:t>Oct 14</a:t>
+                      </a:r>
+                    </a:p>
+                  </a:txBody>
+                  <a:tcPr/>
+                </a:tc>
+                <a:tc>
+                  <a:txBody>
+                    <a:bodyPr/>
+                    <a:lstStyle/>
+                    <a:p>
+                      <a:r>
+                        <a:rPr lang="en-US" sz="2400" dirty="0"/>
+                        <a:t>Nov 6</a:t>
                       </a:r>
                     </a:p>
                   </a:txBody>
@@ -6928,7 +7129,7 @@
                     <a:lstStyle/>
                     <a:p>
                       <a:r>
-                        <a:rPr lang="en-US" sz="2800" dirty="0"/>
+                        <a:rPr lang="en-US" sz="2400" dirty="0"/>
                         <a:t>#4</a:t>
                       </a:r>
                     </a:p>
@@ -6940,9 +7141,26 @@
                     <a:bodyPr/>
                     <a:lstStyle/>
                     <a:p>
+                      <a:pPr marL="0" marR="0" lvl="0" indent="0" algn="l" defTabSz="914400" rtl="0" eaLnBrk="1" fontAlgn="auto" latinLnBrk="0" hangingPunct="1">
+                        <a:lnSpc>
+                          <a:spcPct val="100000"/>
+                        </a:lnSpc>
+                        <a:spcBef>
+                          <a:spcPts val="0"/>
+                        </a:spcBef>
+                        <a:spcAft>
+                          <a:spcPts val="0"/>
+                        </a:spcAft>
+                        <a:buClrTx/>
+                        <a:buSzTx/>
+                        <a:buFontTx/>
+                        <a:buNone/>
+                        <a:tabLst/>
+                        <a:defRPr/>
+                      </a:pPr>
                       <a:r>
-                        <a:rPr lang="en-US" sz="2800" dirty="0"/>
-                        <a:t>Apr 6</a:t>
+                        <a:rPr lang="en-US" sz="2400" dirty="0"/>
+                        <a:t>Intermediate Code Generation – Part 2</a:t>
                       </a:r>
                     </a:p>
                   </a:txBody>
@@ -6954,8 +7172,21 @@
                     <a:lstStyle/>
                     <a:p>
                       <a:r>
-                        <a:rPr lang="en-US" sz="2800" dirty="0"/>
-                        <a:t>Apr 29</a:t>
+                        <a:rPr lang="en-US" sz="2400" dirty="0"/>
+                        <a:t>Nov 11</a:t>
+                      </a:r>
+                    </a:p>
+                  </a:txBody>
+                  <a:tcPr/>
+                </a:tc>
+                <a:tc>
+                  <a:txBody>
+                    <a:bodyPr/>
+                    <a:lstStyle/>
+                    <a:p>
+                      <a:r>
+                        <a:rPr lang="en-US" sz="2400" dirty="0"/>
+                        <a:t>Dec 4</a:t>
                       </a:r>
                     </a:p>
                   </a:txBody>
@@ -6985,8 +7216,8 @@
         </p:nvSpPr>
         <p:spPr>
           <a:xfrm>
-            <a:off x="834975" y="5006230"/>
-            <a:ext cx="9937849" cy="830997"/>
+            <a:off x="729343" y="5081838"/>
+            <a:ext cx="6239978" cy="1200329"/>
           </a:xfrm>
           <a:prstGeom prst="rect">
             <a:avLst/>
@@ -7015,17 +7246,17 @@
             </a:pPr>
             <a:r>
               <a:rPr lang="en-US" sz="2400" dirty="0"/>
-              <a:t>Deduct 1pt for each passed day after due date </a:t>
-            </a:r>
-            <a:r>
-              <a:rPr lang="en-US" sz="2400" dirty="0">
-                <a:sym typeface="Wingdings" pitchFamily="2" charset="2"/>
-              </a:rPr>
-              <a:t> after 5 days, no grade left</a:t>
-            </a:r>
+              <a:t>Deduct 1pt for each passed day after due date</a:t>
+            </a:r>
+          </a:p>
+          <a:p>
+            <a:pPr marL="285750" indent="-285750">
+              <a:buFont typeface="Arial" panose="020B0604020202020204" pitchFamily="34" charset="0"/>
+              <a:buChar char="•"/>
+            </a:pPr>
             <a:r>
               <a:rPr lang="en-US" sz="2400" dirty="0"/>
-              <a:t> </a:t>
+              <a:t>Only accept late submissions up to 3 days late.</a:t>
             </a:r>
           </a:p>
         </p:txBody>

</xml_diff>

<commit_message>
Small update to preliminaries
</commit_message>
<xml_diff>
--- a/C0-preliminaries.pptx
+++ b/C0-preliminaries.pptx
@@ -5,7 +5,7 @@
     <p:sldMasterId id="2147483648" r:id="rId1"/>
   </p:sldMasterIdLst>
   <p:notesMasterIdLst>
-    <p:notesMasterId r:id="rId18"/>
+    <p:notesMasterId r:id="rId20"/>
   </p:notesMasterIdLst>
   <p:sldIdLst>
     <p:sldId id="256" r:id="rId2"/>
@@ -22,8 +22,10 @@
     <p:sldId id="265" r:id="rId13"/>
     <p:sldId id="270" r:id="rId14"/>
     <p:sldId id="269" r:id="rId15"/>
-    <p:sldId id="267" r:id="rId16"/>
-    <p:sldId id="263" r:id="rId17"/>
+    <p:sldId id="272" r:id="rId16"/>
+    <p:sldId id="273" r:id="rId17"/>
+    <p:sldId id="267" r:id="rId18"/>
+    <p:sldId id="263" r:id="rId19"/>
   </p:sldIdLst>
   <p:sldSz cx="12192000" cy="6858000"/>
   <p:notesSz cx="6858000" cy="9144000"/>
@@ -212,7 +214,7 @@
           <a:p>
             <a:fld id="{B1705F56-3A3C-9F45-82E1-974975E83314}" type="datetimeFigureOut">
               <a:rPr lang="en-US" smtClean="0"/>
-              <a:t>8/21/20</a:t>
+              <a:t>8/26/20</a:t>
             </a:fld>
             <a:endParaRPr lang="en-US"/>
           </a:p>
@@ -626,7 +628,7 @@
           <a:p>
             <a:fld id="{B636A413-A1CC-CD48-9584-751D89CE81E1}" type="datetime1">
               <a:rPr lang="en-US" smtClean="0"/>
-              <a:t>8/21/20</a:t>
+              <a:t>8/26/20</a:t>
             </a:fld>
             <a:endParaRPr lang="en-US"/>
           </a:p>
@@ -827,7 +829,7 @@
           <a:p>
             <a:fld id="{E1354D63-68F0-9647-B536-4263FBF27E9F}" type="datetime1">
               <a:rPr lang="en-US" smtClean="0"/>
-              <a:t>8/21/20</a:t>
+              <a:t>8/26/20</a:t>
             </a:fld>
             <a:endParaRPr lang="en-US"/>
           </a:p>
@@ -1038,7 +1040,7 @@
           <a:p>
             <a:fld id="{F5D9CFB9-61F7-8A4C-AD69-67C2D113D776}" type="datetime1">
               <a:rPr lang="en-US" smtClean="0"/>
-              <a:t>8/21/20</a:t>
+              <a:t>8/26/20</a:t>
             </a:fld>
             <a:endParaRPr lang="en-US"/>
           </a:p>
@@ -1239,7 +1241,7 @@
           <a:p>
             <a:fld id="{FAD571EC-F5A0-FD49-8239-D310E199B9F3}" type="datetime1">
               <a:rPr lang="en-US" smtClean="0"/>
-              <a:t>8/21/20</a:t>
+              <a:t>8/26/20</a:t>
             </a:fld>
             <a:endParaRPr lang="en-US"/>
           </a:p>
@@ -1517,7 +1519,7 @@
           <a:p>
             <a:fld id="{BC16F984-79D0-D341-8C08-3C6D93E11D18}" type="datetime1">
               <a:rPr lang="en-US" smtClean="0"/>
-              <a:t>8/21/20</a:t>
+              <a:t>8/26/20</a:t>
             </a:fld>
             <a:endParaRPr lang="en-US"/>
           </a:p>
@@ -1785,7 +1787,7 @@
           <a:p>
             <a:fld id="{5A5A3D16-5D9A-6D4D-85BF-98D6AFE50F81}" type="datetime1">
               <a:rPr lang="en-US" smtClean="0"/>
-              <a:t>8/21/20</a:t>
+              <a:t>8/26/20</a:t>
             </a:fld>
             <a:endParaRPr lang="en-US"/>
           </a:p>
@@ -2200,7 +2202,7 @@
           <a:p>
             <a:fld id="{FAC4073C-E934-844C-850F-5144159CD358}" type="datetime1">
               <a:rPr lang="en-US" smtClean="0"/>
-              <a:t>8/21/20</a:t>
+              <a:t>8/26/20</a:t>
             </a:fld>
             <a:endParaRPr lang="en-US"/>
           </a:p>
@@ -2344,7 +2346,7 @@
           <a:p>
             <a:fld id="{2BF32EF1-264C-B948-B02C-28DB295F8177}" type="datetime1">
               <a:rPr lang="en-US" smtClean="0"/>
-              <a:t>8/21/20</a:t>
+              <a:t>8/26/20</a:t>
             </a:fld>
             <a:endParaRPr lang="en-US"/>
           </a:p>
@@ -2460,7 +2462,7 @@
           <a:p>
             <a:fld id="{50BD370F-BC0F-4547-BA0C-9B1A91BB0139}" type="datetime1">
               <a:rPr lang="en-US" smtClean="0"/>
-              <a:t>8/21/20</a:t>
+              <a:t>8/26/20</a:t>
             </a:fld>
             <a:endParaRPr lang="en-US"/>
           </a:p>
@@ -2774,7 +2776,7 @@
           <a:p>
             <a:fld id="{410B318A-D3FE-0A45-8302-770BB2BBADA1}" type="datetime1">
               <a:rPr lang="en-US" smtClean="0"/>
-              <a:t>8/21/20</a:t>
+              <a:t>8/26/20</a:t>
             </a:fld>
             <a:endParaRPr lang="en-US"/>
           </a:p>
@@ -3065,7 +3067,7 @@
           <a:p>
             <a:fld id="{71D2B0EA-B374-764B-A3CE-44052DF0C9A6}" type="datetime1">
               <a:rPr lang="en-US" smtClean="0"/>
-              <a:t>8/21/20</a:t>
+              <a:t>8/26/20</a:t>
             </a:fld>
             <a:endParaRPr lang="en-US"/>
           </a:p>
@@ -3309,7 +3311,7 @@
           <a:p>
             <a:fld id="{683A4360-EFAF-A345-A6F4-DC5461235985}" type="datetime1">
               <a:rPr lang="en-US" smtClean="0"/>
-              <a:t>8/21/20</a:t>
+              <a:t>8/26/20</a:t>
             </a:fld>
             <a:endParaRPr lang="en-US"/>
           </a:p>
@@ -3831,7 +3833,12 @@
             <p:ph type="title"/>
           </p:nvPr>
         </p:nvSpPr>
-        <p:spPr/>
+        <p:spPr>
+          <a:xfrm>
+            <a:off x="478971" y="115660"/>
+            <a:ext cx="10515600" cy="1325563"/>
+          </a:xfrm>
+        </p:spPr>
         <p:txBody>
           <a:bodyPr/>
           <a:lstStyle/>
@@ -3859,83 +3866,133 @@
             <p:ph idx="1"/>
           </p:nvPr>
         </p:nvSpPr>
-        <p:spPr/>
+        <p:spPr>
+          <a:xfrm>
+            <a:off x="359227" y="1253331"/>
+            <a:ext cx="11484429" cy="4351338"/>
+          </a:xfrm>
+        </p:spPr>
         <p:txBody>
           <a:bodyPr>
-            <a:normAutofit fontScale="92500" lnSpcReduction="10000"/>
+            <a:noAutofit/>
           </a:bodyPr>
           <a:lstStyle/>
           <a:p>
             <a:r>
-              <a:rPr lang="en-US" sz="2400" dirty="0"/>
+              <a:rPr lang="en-US" sz="2100" dirty="0"/>
               <a:t>Highly recommend having access to a laptop or desktop either with Linux or with Mac OS, if you use Windows you might have more trouble</a:t>
             </a:r>
           </a:p>
           <a:p>
             <a:r>
-              <a:rPr lang="en-US" sz="2400" dirty="0"/>
-              <a:t>Just learnt last semester that one can install and run Linux on Windows, but I still don’t like it.</a:t>
-            </a:r>
-          </a:p>
-          <a:p>
-            <a:r>
-              <a:rPr lang="en-US" sz="2400" dirty="0"/>
+              <a:rPr lang="en-US" sz="2100" dirty="0"/>
+              <a:t>Just learnt last semester that one can install and run Linux on Windows, but I still don’t like it. Here a bunch of links (that I haven’t tried):</a:t>
+            </a:r>
+          </a:p>
+          <a:p>
+            <a:pPr lvl="1">
+              <a:buFont typeface="Wingdings" pitchFamily="2" charset="2"/>
+              <a:buChar char="§"/>
+            </a:pPr>
+            <a:r>
+              <a:rPr lang="en-US" sz="2100" dirty="0">
+                <a:hlinkClick r:id="rId2"/>
+              </a:rPr>
+              <a:t>Microsoft tutorial/</a:t>
+            </a:r>
+            <a:r>
+              <a:rPr lang="en-US" sz="2100" dirty="0" err="1">
+                <a:hlinkClick r:id="rId2"/>
+              </a:rPr>
+              <a:t>howto</a:t>
+            </a:r>
+            <a:endParaRPr lang="en-US" sz="2100" dirty="0"/>
+          </a:p>
+          <a:p>
+            <a:pPr lvl="1">
+              <a:buFont typeface="Wingdings" pitchFamily="2" charset="2"/>
+              <a:buChar char="§"/>
+            </a:pPr>
+            <a:r>
+              <a:rPr lang="en-US" sz="2100" dirty="0">
+                <a:hlinkClick r:id="rId3"/>
+              </a:rPr>
+              <a:t>Ubuntu tutorial</a:t>
+            </a:r>
+            <a:endParaRPr lang="en-US" sz="2100" dirty="0"/>
+          </a:p>
+          <a:p>
+            <a:pPr lvl="1">
+              <a:buFont typeface="Wingdings" pitchFamily="2" charset="2"/>
+              <a:buChar char="§"/>
+            </a:pPr>
+            <a:r>
+              <a:rPr lang="en-US" sz="2100" dirty="0">
+                <a:hlinkClick r:id="rId4"/>
+              </a:rPr>
+              <a:t>Youtube video howto</a:t>
+            </a:r>
+            <a:endParaRPr lang="en-US" sz="2100" dirty="0"/>
+          </a:p>
+          <a:p>
+            <a:r>
+              <a:rPr lang="en-US" sz="2100" dirty="0"/>
               <a:t>Recommend checking that you have the following tools installed and accessible somewhere:</a:t>
             </a:r>
           </a:p>
           <a:p>
             <a:pPr lvl="1"/>
             <a:r>
-              <a:rPr lang="en-US" dirty="0"/>
+              <a:rPr lang="en-US" sz="2100" dirty="0"/>
               <a:t>A good C compiler (GCC, Clang, ICC, </a:t>
             </a:r>
             <a:r>
-              <a:rPr lang="en-US" dirty="0" err="1"/>
+              <a:rPr lang="en-US" sz="2100" dirty="0" err="1"/>
               <a:t>etc</a:t>
             </a:r>
             <a:r>
-              <a:rPr lang="en-US" dirty="0"/>
+              <a:rPr lang="en-US" sz="2100" dirty="0"/>
               <a:t>)</a:t>
             </a:r>
           </a:p>
           <a:p>
             <a:pPr lvl="1"/>
             <a:r>
-              <a:rPr lang="en-US" dirty="0"/>
+              <a:rPr lang="en-US" sz="2100" dirty="0"/>
               <a:t>Scheme </a:t>
             </a:r>
           </a:p>
           <a:p>
             <a:pPr lvl="1"/>
             <a:r>
-              <a:rPr lang="en-US" dirty="0"/>
+              <a:rPr lang="en-US" sz="2100" dirty="0"/>
               <a:t>Python</a:t>
             </a:r>
           </a:p>
           <a:p>
             <a:pPr lvl="1"/>
             <a:r>
-              <a:rPr lang="en-US" dirty="0"/>
+              <a:rPr lang="en-US" sz="2100" dirty="0"/>
               <a:t>Flex (Scanner generator) and Bison (Parser Generator)</a:t>
             </a:r>
           </a:p>
           <a:p>
             <a:r>
-              <a:rPr lang="en-US" sz="2400" dirty="0"/>
+              <a:rPr lang="en-US" sz="2100" dirty="0"/>
               <a:t>You will need some knowledge of C</a:t>
             </a:r>
           </a:p>
           <a:p>
             <a:r>
-              <a:rPr lang="en-US" sz="2400" dirty="0"/>
+              <a:rPr lang="en-US" sz="2100" dirty="0"/>
               <a:t>Read / learn about package managers such as: </a:t>
             </a:r>
             <a:r>
-              <a:rPr lang="en-US" sz="2400" b="1" u="sng" dirty="0"/>
+              <a:rPr lang="en-US" sz="2100" b="1" u="sng" dirty="0"/>
               <a:t>apt</a:t>
             </a:r>
             <a:r>
-              <a:rPr lang="en-US" sz="2400" dirty="0"/>
+              <a:rPr lang="en-US" sz="2100" dirty="0"/>
               <a:t> in Ubuntu Linux</a:t>
             </a:r>
           </a:p>
@@ -4784,7 +4841,7 @@
                   <a:srgbClr val="0070C0"/>
                 </a:solidFill>
               </a:rPr>
-              <a:t>Overview of Compiler Optimizations (Not covered in book): 1 week</a:t>
+              <a:t>Overview of Compiler Optimizations : 1 week</a:t>
             </a:r>
           </a:p>
         </p:txBody>
@@ -4963,6 +5020,41 @@
           </a:p>
         </p:txBody>
       </p:sp>
+      <p:sp>
+        <p:nvSpPr>
+          <p:cNvPr id="6" name="TextBox 5">
+            <a:extLst>
+              <a:ext uri="{FF2B5EF4-FFF2-40B4-BE49-F238E27FC236}">
+                <a16:creationId xmlns:a16="http://schemas.microsoft.com/office/drawing/2014/main" id="{285F366C-13D2-5B41-AAF6-30D4943674D9}"/>
+              </a:ext>
+            </a:extLst>
+          </p:cNvPr>
+          <p:cNvSpPr txBox="1"/>
+          <p:nvPr/>
+        </p:nvSpPr>
+        <p:spPr>
+          <a:xfrm>
+            <a:off x="446314" y="6069880"/>
+            <a:ext cx="2577950" cy="215444"/>
+          </a:xfrm>
+          <a:prstGeom prst="rect">
+            <a:avLst/>
+          </a:prstGeom>
+          <a:noFill/>
+        </p:spPr>
+        <p:txBody>
+          <a:bodyPr wrap="none" rtlCol="0">
+            <a:spAutoFit/>
+          </a:bodyPr>
+          <a:lstStyle/>
+          <a:p>
+            <a:r>
+              <a:rPr lang="en-US" sz="800" dirty="0"/>
+              <a:t>Chapter numbers refer to Scott’s book, just for reference </a:t>
+            </a:r>
+          </a:p>
+        </p:txBody>
+      </p:sp>
     </p:spTree>
     <p:extLst>
       <p:ext uri="{BB962C8B-B14F-4D97-AF65-F5344CB8AC3E}">
@@ -4998,7 +5090,7 @@
           <p:cNvPr id="2" name="Title 1">
             <a:extLst>
               <a:ext uri="{FF2B5EF4-FFF2-40B4-BE49-F238E27FC236}">
-                <a16:creationId xmlns:a16="http://schemas.microsoft.com/office/drawing/2014/main" id="{9460B25B-F24B-CA4D-A4A3-69F5B6DC305D}"/>
+                <a16:creationId xmlns:a16="http://schemas.microsoft.com/office/drawing/2014/main" id="{89B07FAE-1994-E840-ABC0-C467BEB13E2A}"/>
               </a:ext>
             </a:extLst>
           </p:cNvPr>
@@ -5007,99 +5099,249 @@
           </p:cNvSpPr>
           <p:nvPr>
             <p:ph type="title"/>
-          </p:nvPr>
-        </p:nvSpPr>
-        <p:spPr/>
-        <p:txBody>
-          <a:bodyPr/>
-          <a:lstStyle/>
-          <a:p>
-            <a:r>
-              <a:rPr lang="en-US" dirty="0"/>
-              <a:t>Other</a:t>
-            </a:r>
-          </a:p>
-        </p:txBody>
-      </p:sp>
-      <p:sp>
-        <p:nvSpPr>
-          <p:cNvPr id="3" name="Content Placeholder 2">
-            <a:extLst>
-              <a:ext uri="{FF2B5EF4-FFF2-40B4-BE49-F238E27FC236}">
-                <a16:creationId xmlns:a16="http://schemas.microsoft.com/office/drawing/2014/main" id="{0BFEB765-DEE3-274A-93AB-C7E10DF05DFB}"/>
-              </a:ext>
-            </a:extLst>
-          </p:cNvPr>
-          <p:cNvSpPr>
-            <a:spLocks noGrp="1"/>
-          </p:cNvSpPr>
-          <p:nvPr>
-            <p:ph idx="1"/>
           </p:nvPr>
         </p:nvSpPr>
         <p:spPr>
           <a:xfrm>
-            <a:off x="631371" y="1825625"/>
-            <a:ext cx="11136086" cy="4351338"/>
+            <a:off x="283029" y="0"/>
+            <a:ext cx="10515600" cy="1325563"/>
           </a:xfrm>
         </p:spPr>
         <p:txBody>
+          <a:bodyPr/>
+          <a:lstStyle/>
+          <a:p>
+            <a:r>
+              <a:rPr lang="en-US" dirty="0"/>
+              <a:t>COVID-19 (Returning to Campus)</a:t>
+            </a:r>
+          </a:p>
+        </p:txBody>
+      </p:sp>
+      <p:sp>
+        <p:nvSpPr>
+          <p:cNvPr id="3" name="Content Placeholder 2">
+            <a:extLst>
+              <a:ext uri="{FF2B5EF4-FFF2-40B4-BE49-F238E27FC236}">
+                <a16:creationId xmlns:a16="http://schemas.microsoft.com/office/drawing/2014/main" id="{A9E67FE1-EEFD-0E43-A281-4E2E66C8ED6F}"/>
+              </a:ext>
+            </a:extLst>
+          </p:cNvPr>
+          <p:cNvSpPr>
+            <a:spLocks noGrp="1"/>
+          </p:cNvSpPr>
+          <p:nvPr>
+            <p:ph idx="1"/>
+          </p:nvPr>
+        </p:nvSpPr>
+        <p:spPr>
+          <a:xfrm>
+            <a:off x="217714" y="1118054"/>
+            <a:ext cx="11756571" cy="4351338"/>
+          </a:xfrm>
+        </p:spPr>
+        <p:txBody>
           <a:bodyPr>
-            <a:normAutofit fontScale="92500" lnSpcReduction="10000"/>
+            <a:noAutofit/>
           </a:bodyPr>
           <a:lstStyle/>
           <a:p>
-            <a:r>
-              <a:rPr lang="en-US" dirty="0"/>
-              <a:t>Please be respectful</a:t>
-            </a:r>
-          </a:p>
-          <a:p>
-            <a:r>
-              <a:rPr lang="en-US" dirty="0"/>
-              <a:t>Please avoid leaving classroom in the middle of the class: it disrupts the class</a:t>
-            </a:r>
-          </a:p>
-          <a:p>
-            <a:r>
-              <a:rPr lang="en-US" dirty="0"/>
-              <a:t>Please avoid taking phone / video calls</a:t>
-            </a:r>
-          </a:p>
-          <a:p>
-            <a:r>
-              <a:rPr lang="en-US" dirty="0"/>
-              <a:t>Feel free to use your laptop</a:t>
-            </a:r>
-          </a:p>
-          <a:p>
-            <a:r>
-              <a:rPr lang="en-US" dirty="0"/>
-              <a:t>Always wear mask in classroom</a:t>
-            </a:r>
-          </a:p>
-          <a:p>
-            <a:r>
-              <a:rPr lang="en-US" dirty="0"/>
-              <a:t>Keep your distance</a:t>
-            </a:r>
-          </a:p>
-          <a:p>
-            <a:r>
-              <a:rPr lang="en-US" dirty="0"/>
-              <a:t>Usable seats in classroom are marked.</a:t>
-            </a:r>
-          </a:p>
-          <a:p>
-            <a:r>
-              <a:rPr lang="en-US" dirty="0"/>
-              <a:t>No eating or drinking in class (for safety).</a:t>
-            </a:r>
-          </a:p>
-          <a:p>
-            <a:r>
-              <a:rPr lang="en-US" dirty="0"/>
-              <a:t>If you come to class, I suggest always cleaning the surface you occupy (table/chairs).</a:t>
+            <a:pPr marL="0" indent="0">
+              <a:buNone/>
+            </a:pPr>
+            <a:r>
+              <a:rPr lang="en-US" sz="1800" dirty="0"/>
+              <a:t>  </a:t>
+            </a:r>
+            <a:r>
+              <a:rPr lang="en-US" sz="1800" b="1" dirty="0"/>
+              <a:t>OU Faculty, Staff, and Students </a:t>
+            </a:r>
+            <a:r>
+              <a:rPr lang="en-US" sz="1800" dirty="0"/>
+              <a:t>– You must complete the </a:t>
+            </a:r>
+            <a:r>
+              <a:rPr lang="en-US" sz="1800" u="sng" dirty="0">
+                <a:hlinkClick r:id="rId2"/>
+              </a:rPr>
+              <a:t>COVID-19 Screening and Reporting Tool</a:t>
+            </a:r>
+            <a:r>
+              <a:rPr lang="en-US" sz="1800" dirty="0"/>
+              <a:t> each time any of the following applies:</a:t>
+            </a:r>
+          </a:p>
+          <a:p>
+            <a:pPr marL="0" indent="0">
+              <a:buNone/>
+            </a:pPr>
+            <a:r>
+              <a:rPr lang="en-US" sz="1800" dirty="0"/>
+              <a:t>1) </a:t>
+            </a:r>
+            <a:r>
+              <a:rPr lang="en-US" sz="1800" b="1" dirty="0"/>
+              <a:t>  Absence from Campus </a:t>
+            </a:r>
+            <a:r>
+              <a:rPr lang="en-US" sz="1800" dirty="0"/>
+              <a:t>– Employees and students who have been away from campus for any reason for </a:t>
+            </a:r>
+            <a:r>
+              <a:rPr lang="en-US" sz="1800" b="1" dirty="0"/>
+              <a:t>7 consecutive calendar days or more </a:t>
+            </a:r>
+            <a:r>
+              <a:rPr lang="en-US" sz="1800" dirty="0"/>
+              <a:t>must complete the COVID-19 Screening and Reporting Tool.</a:t>
+            </a:r>
+          </a:p>
+          <a:p>
+            <a:pPr marL="0" indent="0">
+              <a:buNone/>
+            </a:pPr>
+            <a:r>
+              <a:rPr lang="en-US" sz="1800" dirty="0"/>
+              <a:t>2) </a:t>
+            </a:r>
+            <a:r>
+              <a:rPr lang="en-US" sz="1800" b="1" dirty="0"/>
+              <a:t>  Travel </a:t>
+            </a:r>
+            <a:r>
+              <a:rPr lang="en-US" sz="1800" dirty="0"/>
+              <a:t>– Employees and students who have </a:t>
+            </a:r>
+            <a:r>
+              <a:rPr lang="en-US" sz="1800" b="1" dirty="0"/>
+              <a:t>traveled domestically or internationally</a:t>
+            </a:r>
+            <a:r>
+              <a:rPr lang="en-US" sz="1800" dirty="0"/>
+              <a:t> must complete the COVID-19 Screening and Reporting Tool unless the traveler qualifies for the Commuter Process. Domestic travel is defined as travel outside the State of Oklahoma.</a:t>
+            </a:r>
+            <a:r>
+              <a:rPr lang="en-US" sz="1800" u="sng" dirty="0">
+                <a:hlinkClick r:id="rId3"/>
+              </a:rPr>
+              <a:t>⁽</a:t>
+            </a:r>
+            <a:endParaRPr lang="en-US" sz="1800" u="sng" dirty="0"/>
+          </a:p>
+          <a:p>
+            <a:pPr marL="0" indent="0">
+              <a:buNone/>
+            </a:pPr>
+            <a:r>
+              <a:rPr lang="en-US" sz="1800" dirty="0"/>
+              <a:t>3)</a:t>
+            </a:r>
+            <a:r>
+              <a:rPr lang="en-US" sz="1800" b="1" dirty="0"/>
+              <a:t>   Close Contact</a:t>
+            </a:r>
+            <a:r>
+              <a:rPr lang="en-US" sz="1800" dirty="0"/>
+              <a:t> – Employees and students who have had close </a:t>
+            </a:r>
+            <a:r>
+              <a:rPr lang="en-US" sz="1800" b="1" dirty="0"/>
+              <a:t>contact with an individual diagnosed with COVID-19</a:t>
+            </a:r>
+            <a:r>
+              <a:rPr lang="en-US" sz="1800" dirty="0"/>
+              <a:t> or who has had symptoms of COVID-19 in the last 14 days must complete the COVID-19 Screening and Reporting Tool.</a:t>
+            </a:r>
+          </a:p>
+          <a:p>
+            <a:pPr marL="0" indent="0">
+              <a:buNone/>
+            </a:pPr>
+            <a:r>
+              <a:rPr lang="en-US" sz="1800" dirty="0"/>
+              <a:t>4)</a:t>
+            </a:r>
+            <a:r>
+              <a:rPr lang="en-US" sz="1800" b="1" dirty="0"/>
+              <a:t>   Experiencing Symptoms</a:t>
+            </a:r>
+            <a:r>
+              <a:rPr lang="en-US" sz="1800" dirty="0"/>
+              <a:t> – Employees and students </a:t>
+            </a:r>
+            <a:r>
+              <a:rPr lang="en-US" sz="1800" b="1" dirty="0"/>
+              <a:t>experiencing </a:t>
+            </a:r>
+            <a:r>
+              <a:rPr lang="en-US" sz="1800" b="1" dirty="0">
+                <a:solidFill>
+                  <a:srgbClr val="FF0000"/>
+                </a:solidFill>
+                <a:hlinkClick r:id="rId4">
+                  <a:extLst>
+                    <a:ext uri="{A12FA001-AC4F-418D-AE19-62706E023703}">
+                      <ahyp:hlinkClr xmlns:ahyp="http://schemas.microsoft.com/office/drawing/2018/hyperlinkcolor" val="tx"/>
+                    </a:ext>
+                  </a:extLst>
+                </a:hlinkClick>
+              </a:rPr>
+              <a:t>symptoms</a:t>
+            </a:r>
+            <a:r>
+              <a:rPr lang="en-US" sz="1800" dirty="0"/>
+              <a:t> that could be consistent with COVID-19, such as fever, cough, shortness of breath or difficulty breathing, chills, muscle pain, sore throat, recent loss of taste or smell, and/or extreme fatigue, must complete the COVID-19 Screening and Reporting Tool. They should also contact their health care provider regarding specific symptoms.</a:t>
+            </a:r>
+          </a:p>
+          <a:p>
+            <a:pPr marL="0" indent="0">
+              <a:buNone/>
+            </a:pPr>
+            <a:r>
+              <a:rPr lang="en-US" sz="1800" dirty="0"/>
+              <a:t>5)   </a:t>
+            </a:r>
+            <a:r>
+              <a:rPr lang="en-US" sz="1800" b="1" dirty="0"/>
+              <a:t>Positive Test</a:t>
+            </a:r>
+            <a:r>
+              <a:rPr lang="en-US" sz="1800" dirty="0"/>
+              <a:t> – Employees and students who </a:t>
+            </a:r>
+            <a:r>
+              <a:rPr lang="en-US" sz="1800" b="1" dirty="0"/>
+              <a:t>test positive for COVID-19</a:t>
+            </a:r>
+            <a:r>
+              <a:rPr lang="en-US" sz="1800" dirty="0"/>
+              <a:t> may not return to campus until they have been cleared by Goddard Health Center to return.</a:t>
+            </a:r>
+          </a:p>
+          <a:p>
+            <a:pPr marL="0" indent="0">
+              <a:buNone/>
+            </a:pPr>
+            <a:r>
+              <a:rPr lang="en-US" sz="1800" dirty="0"/>
+              <a:t>6)   </a:t>
+            </a:r>
+            <a:r>
+              <a:rPr lang="en-US" sz="1800" b="1" dirty="0"/>
+              <a:t>Positive Household Member</a:t>
+            </a:r>
+            <a:r>
+              <a:rPr lang="en-US" sz="1800" dirty="0"/>
+              <a:t> – Employees and students with a </a:t>
+            </a:r>
+            <a:r>
+              <a:rPr lang="en-US" sz="1800" b="1" dirty="0"/>
+              <a:t>household member who has tested positive</a:t>
+            </a:r>
+            <a:r>
+              <a:rPr lang="en-US" sz="1800" dirty="0"/>
+              <a:t> for COVID-19 in the past 14 days must complete the COVID-19 Screening and Reporting Tool.</a:t>
             </a:r>
           </a:p>
         </p:txBody>
@@ -5109,7 +5351,7 @@
           <p:cNvPr id="4" name="Footer Placeholder 3">
             <a:extLst>
               <a:ext uri="{FF2B5EF4-FFF2-40B4-BE49-F238E27FC236}">
-                <a16:creationId xmlns:a16="http://schemas.microsoft.com/office/drawing/2014/main" id="{A168590A-B5EE-8B4D-B0F3-60484F41CF64}"/>
+                <a16:creationId xmlns:a16="http://schemas.microsoft.com/office/drawing/2014/main" id="{6CCEF927-D631-FF4B-91A1-F6DA5935BAB0}"/>
               </a:ext>
             </a:extLst>
           </p:cNvPr>
@@ -5137,7 +5379,7 @@
           <p:cNvPr id="5" name="Slide Number Placeholder 4">
             <a:extLst>
               <a:ext uri="{FF2B5EF4-FFF2-40B4-BE49-F238E27FC236}">
-                <a16:creationId xmlns:a16="http://schemas.microsoft.com/office/drawing/2014/main" id="{02DC49D8-2E4B-2446-8692-D142238E606C}"/>
+                <a16:creationId xmlns:a16="http://schemas.microsoft.com/office/drawing/2014/main" id="{149A53D0-7E6F-7249-A369-A2BCC1F884B1}"/>
               </a:ext>
             </a:extLst>
           </p:cNvPr>
@@ -5164,7 +5406,7 @@
     </p:spTree>
     <p:extLst>
       <p:ext uri="{BB962C8B-B14F-4D97-AF65-F5344CB8AC3E}">
-        <p14:creationId xmlns:p14="http://schemas.microsoft.com/office/powerpoint/2010/main" val="4233885510"/>
+        <p14:creationId xmlns:p14="http://schemas.microsoft.com/office/powerpoint/2010/main" val="1093261276"/>
       </p:ext>
     </p:extLst>
   </p:cSld>
@@ -5196,7 +5438,7 @@
           <p:cNvPr id="2" name="Title 1">
             <a:extLst>
               <a:ext uri="{FF2B5EF4-FFF2-40B4-BE49-F238E27FC236}">
-                <a16:creationId xmlns:a16="http://schemas.microsoft.com/office/drawing/2014/main" id="{3988425F-ABAC-3049-A2E9-469AE4741E0E}"/>
+                <a16:creationId xmlns:a16="http://schemas.microsoft.com/office/drawing/2014/main" id="{89B07FAE-1994-E840-ABC0-C467BEB13E2A}"/>
               </a:ext>
             </a:extLst>
           </p:cNvPr>
@@ -5207,14 +5449,19 @@
             <p:ph type="title"/>
           </p:nvPr>
         </p:nvSpPr>
-        <p:spPr/>
-        <p:txBody>
-          <a:bodyPr/>
-          <a:lstStyle/>
-          <a:p>
-            <a:r>
-              <a:rPr lang="en-US" dirty="0"/>
-              <a:t>Questions?</a:t>
+        <p:spPr>
+          <a:xfrm>
+            <a:off x="283029" y="0"/>
+            <a:ext cx="10515600" cy="1325563"/>
+          </a:xfrm>
+        </p:spPr>
+        <p:txBody>
+          <a:bodyPr/>
+          <a:lstStyle/>
+          <a:p>
+            <a:r>
+              <a:rPr lang="en-US" dirty="0"/>
+              <a:t>COVID-19 (Testing, Isolation, Contact Tracing)</a:t>
             </a:r>
           </a:p>
         </p:txBody>
@@ -5224,7 +5471,7 @@
           <p:cNvPr id="3" name="Content Placeholder 2">
             <a:extLst>
               <a:ext uri="{FF2B5EF4-FFF2-40B4-BE49-F238E27FC236}">
-                <a16:creationId xmlns:a16="http://schemas.microsoft.com/office/drawing/2014/main" id="{BE3A2864-8C97-9C49-9255-835CC1B97CE0}"/>
+                <a16:creationId xmlns:a16="http://schemas.microsoft.com/office/drawing/2014/main" id="{A9E67FE1-EEFD-0E43-A281-4E2E66C8ED6F}"/>
               </a:ext>
             </a:extLst>
           </p:cNvPr>
@@ -5235,12 +5482,110 @@
             <p:ph idx="1"/>
           </p:nvPr>
         </p:nvSpPr>
-        <p:spPr/>
-        <p:txBody>
-          <a:bodyPr/>
-          <a:lstStyle/>
-          <a:p>
-            <a:endParaRPr lang="en-US"/>
+        <p:spPr>
+          <a:xfrm>
+            <a:off x="217714" y="1118054"/>
+            <a:ext cx="11756571" cy="4351338"/>
+          </a:xfrm>
+        </p:spPr>
+        <p:txBody>
+          <a:bodyPr>
+            <a:noAutofit/>
+          </a:bodyPr>
+          <a:lstStyle/>
+          <a:p>
+            <a:pPr marL="0" indent="0">
+              <a:buNone/>
+            </a:pPr>
+            <a:r>
+              <a:rPr lang="en-US" sz="1800" b="1" dirty="0"/>
+              <a:t>Positive Tests</a:t>
+            </a:r>
+            <a:r>
+              <a:rPr lang="en-US" sz="1800" dirty="0"/>
+              <a:t> ‐ If an employee or student tests positive for COVID‐19, the University will cooperate with the appropriate health department in its contact tracing efforts. Employees and students who test positive must fill out the </a:t>
+            </a:r>
+            <a:r>
+              <a:rPr lang="en-US" sz="1800" u="sng" dirty="0">
+                <a:hlinkClick r:id="rId2"/>
+              </a:rPr>
+              <a:t>COVID-19 Screening and Reporting Tool</a:t>
+            </a:r>
+            <a:r>
+              <a:rPr lang="en-US" sz="1800" dirty="0"/>
+              <a:t> and may not report to work or campus until cleared by Goddard Health Center.</a:t>
+            </a:r>
+          </a:p>
+          <a:p>
+            <a:pPr marL="0" indent="0">
+              <a:buNone/>
+            </a:pPr>
+            <a:r>
+              <a:rPr lang="en-US" sz="1800" dirty="0"/>
+              <a:t>1)   Supervisors, RAs, faculty, staff, and others who are made aware that an individual in their area has tested positive must contact Facilities Management at (405) 325-3060 for disinfecting assistance, if the individual was in the area within the last seven days.</a:t>
+            </a:r>
+          </a:p>
+          <a:p>
+            <a:pPr marL="0" indent="0">
+              <a:buNone/>
+            </a:pPr>
+            <a:r>
+              <a:rPr lang="en-US" sz="1800" dirty="0"/>
+              <a:t>2)   Faculty, staff, and students who have been in close contact with a laboratory-confirmed COVID-19 positive individual </a:t>
+            </a:r>
+            <a:r>
+              <a:rPr lang="en-US" sz="1800" i="1" dirty="0"/>
+              <a:t>must</a:t>
+            </a:r>
+            <a:r>
+              <a:rPr lang="en-US" sz="1800" dirty="0"/>
+              <a:t> fill out the </a:t>
+            </a:r>
+            <a:r>
+              <a:rPr lang="en-US" sz="1800" u="sng" dirty="0">
+                <a:hlinkClick r:id="rId2"/>
+              </a:rPr>
+              <a:t>COVID-19 Screening and Reporting Tool</a:t>
+            </a:r>
+            <a:r>
+              <a:rPr lang="en-US" sz="1800" dirty="0"/>
+              <a:t> and may not report to work or campus until cleared by Goddard Health Center.</a:t>
+            </a:r>
+          </a:p>
+          <a:p>
+            <a:pPr marL="0" indent="0">
+              <a:buNone/>
+            </a:pPr>
+            <a:r>
+              <a:rPr lang="en-US" sz="1800" dirty="0"/>
+              <a:t>a.   The CDC defines </a:t>
+            </a:r>
+            <a:r>
+              <a:rPr lang="en-US" sz="1800" u="sng" dirty="0">
+                <a:hlinkClick r:id="rId3"/>
+              </a:rPr>
+              <a:t>“close contact”</a:t>
+            </a:r>
+            <a:r>
+              <a:rPr lang="en-US" sz="1800" dirty="0"/>
+              <a:t> as being within 6 feet of an infected person for at least 15 minutes starting from two days before illness onset (or, for asymptomatic patients, two days prior to specimen collection) until the time the patient is isolated.</a:t>
+            </a:r>
+          </a:p>
+          <a:p>
+            <a:pPr marL="0" indent="0">
+              <a:buNone/>
+            </a:pPr>
+            <a:r>
+              <a:rPr lang="en-US" sz="1800" dirty="0"/>
+              <a:t>3)   </a:t>
+            </a:r>
+            <a:r>
+              <a:rPr lang="en-US" sz="1800" u="sng" dirty="0">
+                <a:hlinkClick r:id="rId4"/>
+              </a:rPr>
+              <a:t>For a list of frequently asked questions regarding COVID-19, visit here.</a:t>
+            </a:r>
+            <a:endParaRPr lang="en-US" sz="1800" dirty="0"/>
           </a:p>
         </p:txBody>
       </p:sp>
@@ -5249,7 +5594,7 @@
           <p:cNvPr id="4" name="Footer Placeholder 3">
             <a:extLst>
               <a:ext uri="{FF2B5EF4-FFF2-40B4-BE49-F238E27FC236}">
-                <a16:creationId xmlns:a16="http://schemas.microsoft.com/office/drawing/2014/main" id="{07C79833-59FE-894A-B05F-47F39D9E3EB4}"/>
+                <a16:creationId xmlns:a16="http://schemas.microsoft.com/office/drawing/2014/main" id="{6CCEF927-D631-FF4B-91A1-F6DA5935BAB0}"/>
               </a:ext>
             </a:extLst>
           </p:cNvPr>
@@ -5277,7 +5622,7 @@
           <p:cNvPr id="5" name="Slide Number Placeholder 4">
             <a:extLst>
               <a:ext uri="{FF2B5EF4-FFF2-40B4-BE49-F238E27FC236}">
-                <a16:creationId xmlns:a16="http://schemas.microsoft.com/office/drawing/2014/main" id="{73F01FD9-6E7E-744C-8E18-EF056B28C1E6}"/>
+                <a16:creationId xmlns:a16="http://schemas.microsoft.com/office/drawing/2014/main" id="{149A53D0-7E6F-7249-A369-A2BCC1F884B1}"/>
               </a:ext>
             </a:extLst>
           </p:cNvPr>
@@ -5296,6 +5641,358 @@
             <a:fld id="{5BE6834E-C558-0A46-B29B-8DEF3296AFA8}" type="slidenum">
               <a:rPr lang="en-US" smtClean="0"/>
               <a:t>16</a:t>
+            </a:fld>
+            <a:endParaRPr lang="en-US"/>
+          </a:p>
+        </p:txBody>
+      </p:sp>
+    </p:spTree>
+    <p:extLst>
+      <p:ext uri="{BB962C8B-B14F-4D97-AF65-F5344CB8AC3E}">
+        <p14:creationId xmlns:p14="http://schemas.microsoft.com/office/powerpoint/2010/main" val="4184440625"/>
+      </p:ext>
+    </p:extLst>
+  </p:cSld>
+  <p:clrMapOvr>
+    <a:masterClrMapping/>
+  </p:clrMapOvr>
+</p:sld>
+</file>
+
+<file path=ppt/slides/slide17.xml><?xml version="1.0" encoding="utf-8"?>
+<p:sld xmlns:a="http://schemas.openxmlformats.org/drawingml/2006/main" xmlns:r="http://schemas.openxmlformats.org/officeDocument/2006/relationships" xmlns:p="http://schemas.openxmlformats.org/presentationml/2006/main">
+  <p:cSld>
+    <p:spTree>
+      <p:nvGrpSpPr>
+        <p:cNvPr id="1" name=""/>
+        <p:cNvGrpSpPr/>
+        <p:nvPr/>
+      </p:nvGrpSpPr>
+      <p:grpSpPr>
+        <a:xfrm>
+          <a:off x="0" y="0"/>
+          <a:ext cx="0" cy="0"/>
+          <a:chOff x="0" y="0"/>
+          <a:chExt cx="0" cy="0"/>
+        </a:xfrm>
+      </p:grpSpPr>
+      <p:sp>
+        <p:nvSpPr>
+          <p:cNvPr id="2" name="Title 1">
+            <a:extLst>
+              <a:ext uri="{FF2B5EF4-FFF2-40B4-BE49-F238E27FC236}">
+                <a16:creationId xmlns:a16="http://schemas.microsoft.com/office/drawing/2014/main" id="{9460B25B-F24B-CA4D-A4A3-69F5B6DC305D}"/>
+              </a:ext>
+            </a:extLst>
+          </p:cNvPr>
+          <p:cNvSpPr>
+            <a:spLocks noGrp="1"/>
+          </p:cNvSpPr>
+          <p:nvPr>
+            <p:ph type="title"/>
+          </p:nvPr>
+        </p:nvSpPr>
+        <p:spPr/>
+        <p:txBody>
+          <a:bodyPr/>
+          <a:lstStyle/>
+          <a:p>
+            <a:r>
+              <a:rPr lang="en-US" dirty="0"/>
+              <a:t>Other</a:t>
+            </a:r>
+          </a:p>
+        </p:txBody>
+      </p:sp>
+      <p:sp>
+        <p:nvSpPr>
+          <p:cNvPr id="3" name="Content Placeholder 2">
+            <a:extLst>
+              <a:ext uri="{FF2B5EF4-FFF2-40B4-BE49-F238E27FC236}">
+                <a16:creationId xmlns:a16="http://schemas.microsoft.com/office/drawing/2014/main" id="{0BFEB765-DEE3-274A-93AB-C7E10DF05DFB}"/>
+              </a:ext>
+            </a:extLst>
+          </p:cNvPr>
+          <p:cNvSpPr>
+            <a:spLocks noGrp="1"/>
+          </p:cNvSpPr>
+          <p:nvPr>
+            <p:ph idx="1"/>
+          </p:nvPr>
+        </p:nvSpPr>
+        <p:spPr>
+          <a:xfrm>
+            <a:off x="620485" y="1509939"/>
+            <a:ext cx="11136086" cy="4351338"/>
+          </a:xfrm>
+        </p:spPr>
+        <p:txBody>
+          <a:bodyPr>
+            <a:normAutofit fontScale="92500" lnSpcReduction="10000"/>
+          </a:bodyPr>
+          <a:lstStyle/>
+          <a:p>
+            <a:r>
+              <a:rPr lang="en-US" dirty="0"/>
+              <a:t>Please be respectful</a:t>
+            </a:r>
+          </a:p>
+          <a:p>
+            <a:r>
+              <a:rPr lang="en-US" dirty="0"/>
+              <a:t>Please avoid leaving classroom in the middle of the class: it disrupts the class</a:t>
+            </a:r>
+          </a:p>
+          <a:p>
+            <a:r>
+              <a:rPr lang="en-US" dirty="0"/>
+              <a:t>Please avoid taking phone / video calls</a:t>
+            </a:r>
+          </a:p>
+          <a:p>
+            <a:r>
+              <a:rPr lang="en-US" dirty="0"/>
+              <a:t>Feel free to use your laptop</a:t>
+            </a:r>
+          </a:p>
+          <a:p>
+            <a:r>
+              <a:rPr lang="en-US" dirty="0"/>
+              <a:t>Always wear mask in classroom</a:t>
+            </a:r>
+          </a:p>
+          <a:p>
+            <a:r>
+              <a:rPr lang="en-US" dirty="0"/>
+              <a:t>Keep your distance</a:t>
+            </a:r>
+          </a:p>
+          <a:p>
+            <a:r>
+              <a:rPr lang="en-US" dirty="0"/>
+              <a:t>Usable seats in classroom are marked.</a:t>
+            </a:r>
+          </a:p>
+          <a:p>
+            <a:r>
+              <a:rPr lang="en-US" dirty="0"/>
+              <a:t>No eating or drinking in class (for safety).</a:t>
+            </a:r>
+          </a:p>
+          <a:p>
+            <a:r>
+              <a:rPr lang="en-US" dirty="0"/>
+              <a:t>If you come to class, I suggest always cleaning the surface you occupy (table/chairs).</a:t>
+            </a:r>
+          </a:p>
+          <a:p>
+            <a:r>
+              <a:rPr lang="en-US" b="1" dirty="0">
+                <a:solidFill>
+                  <a:srgbClr val="0070C0"/>
+                </a:solidFill>
+              </a:rPr>
+              <a:t>When in doubt, always ask me</a:t>
+            </a:r>
+            <a:r>
+              <a:rPr lang="en-US" dirty="0"/>
+              <a:t>.</a:t>
+            </a:r>
+          </a:p>
+        </p:txBody>
+      </p:sp>
+      <p:sp>
+        <p:nvSpPr>
+          <p:cNvPr id="4" name="Footer Placeholder 3">
+            <a:extLst>
+              <a:ext uri="{FF2B5EF4-FFF2-40B4-BE49-F238E27FC236}">
+                <a16:creationId xmlns:a16="http://schemas.microsoft.com/office/drawing/2014/main" id="{A168590A-B5EE-8B4D-B0F3-60484F41CF64}"/>
+              </a:ext>
+            </a:extLst>
+          </p:cNvPr>
+          <p:cNvSpPr>
+            <a:spLocks noGrp="1"/>
+          </p:cNvSpPr>
+          <p:nvPr>
+            <p:ph type="ftr" sz="quarter" idx="11"/>
+          </p:nvPr>
+        </p:nvSpPr>
+        <p:spPr/>
+        <p:txBody>
+          <a:bodyPr/>
+          <a:lstStyle/>
+          <a:p>
+            <a:r>
+              <a:rPr lang="en-US"/>
+              <a:t>Principles of Programming Languages</a:t>
+            </a:r>
+          </a:p>
+        </p:txBody>
+      </p:sp>
+      <p:sp>
+        <p:nvSpPr>
+          <p:cNvPr id="5" name="Slide Number Placeholder 4">
+            <a:extLst>
+              <a:ext uri="{FF2B5EF4-FFF2-40B4-BE49-F238E27FC236}">
+                <a16:creationId xmlns:a16="http://schemas.microsoft.com/office/drawing/2014/main" id="{02DC49D8-2E4B-2446-8692-D142238E606C}"/>
+              </a:ext>
+            </a:extLst>
+          </p:cNvPr>
+          <p:cNvSpPr>
+            <a:spLocks noGrp="1"/>
+          </p:cNvSpPr>
+          <p:nvPr>
+            <p:ph type="sldNum" sz="quarter" idx="12"/>
+          </p:nvPr>
+        </p:nvSpPr>
+        <p:spPr/>
+        <p:txBody>
+          <a:bodyPr/>
+          <a:lstStyle/>
+          <a:p>
+            <a:fld id="{5BE6834E-C558-0A46-B29B-8DEF3296AFA8}" type="slidenum">
+              <a:rPr lang="en-US" smtClean="0"/>
+              <a:t>17</a:t>
+            </a:fld>
+            <a:endParaRPr lang="en-US"/>
+          </a:p>
+        </p:txBody>
+      </p:sp>
+    </p:spTree>
+    <p:extLst>
+      <p:ext uri="{BB962C8B-B14F-4D97-AF65-F5344CB8AC3E}">
+        <p14:creationId xmlns:p14="http://schemas.microsoft.com/office/powerpoint/2010/main" val="4233885510"/>
+      </p:ext>
+    </p:extLst>
+  </p:cSld>
+  <p:clrMapOvr>
+    <a:masterClrMapping/>
+  </p:clrMapOvr>
+</p:sld>
+</file>
+
+<file path=ppt/slides/slide18.xml><?xml version="1.0" encoding="utf-8"?>
+<p:sld xmlns:a="http://schemas.openxmlformats.org/drawingml/2006/main" xmlns:r="http://schemas.openxmlformats.org/officeDocument/2006/relationships" xmlns:p="http://schemas.openxmlformats.org/presentationml/2006/main">
+  <p:cSld>
+    <p:spTree>
+      <p:nvGrpSpPr>
+        <p:cNvPr id="1" name=""/>
+        <p:cNvGrpSpPr/>
+        <p:nvPr/>
+      </p:nvGrpSpPr>
+      <p:grpSpPr>
+        <a:xfrm>
+          <a:off x="0" y="0"/>
+          <a:ext cx="0" cy="0"/>
+          <a:chOff x="0" y="0"/>
+          <a:chExt cx="0" cy="0"/>
+        </a:xfrm>
+      </p:grpSpPr>
+      <p:sp>
+        <p:nvSpPr>
+          <p:cNvPr id="2" name="Title 1">
+            <a:extLst>
+              <a:ext uri="{FF2B5EF4-FFF2-40B4-BE49-F238E27FC236}">
+                <a16:creationId xmlns:a16="http://schemas.microsoft.com/office/drawing/2014/main" id="{3988425F-ABAC-3049-A2E9-469AE4741E0E}"/>
+              </a:ext>
+            </a:extLst>
+          </p:cNvPr>
+          <p:cNvSpPr>
+            <a:spLocks noGrp="1"/>
+          </p:cNvSpPr>
+          <p:nvPr>
+            <p:ph type="title"/>
+          </p:nvPr>
+        </p:nvSpPr>
+        <p:spPr/>
+        <p:txBody>
+          <a:bodyPr/>
+          <a:lstStyle/>
+          <a:p>
+            <a:r>
+              <a:rPr lang="en-US" dirty="0"/>
+              <a:t>Questions?</a:t>
+            </a:r>
+          </a:p>
+        </p:txBody>
+      </p:sp>
+      <p:sp>
+        <p:nvSpPr>
+          <p:cNvPr id="3" name="Content Placeholder 2">
+            <a:extLst>
+              <a:ext uri="{FF2B5EF4-FFF2-40B4-BE49-F238E27FC236}">
+                <a16:creationId xmlns:a16="http://schemas.microsoft.com/office/drawing/2014/main" id="{BE3A2864-8C97-9C49-9255-835CC1B97CE0}"/>
+              </a:ext>
+            </a:extLst>
+          </p:cNvPr>
+          <p:cNvSpPr>
+            <a:spLocks noGrp="1"/>
+          </p:cNvSpPr>
+          <p:nvPr>
+            <p:ph idx="1"/>
+          </p:nvPr>
+        </p:nvSpPr>
+        <p:spPr/>
+        <p:txBody>
+          <a:bodyPr/>
+          <a:lstStyle/>
+          <a:p>
+            <a:endParaRPr lang="en-US"/>
+          </a:p>
+        </p:txBody>
+      </p:sp>
+      <p:sp>
+        <p:nvSpPr>
+          <p:cNvPr id="4" name="Footer Placeholder 3">
+            <a:extLst>
+              <a:ext uri="{FF2B5EF4-FFF2-40B4-BE49-F238E27FC236}">
+                <a16:creationId xmlns:a16="http://schemas.microsoft.com/office/drawing/2014/main" id="{07C79833-59FE-894A-B05F-47F39D9E3EB4}"/>
+              </a:ext>
+            </a:extLst>
+          </p:cNvPr>
+          <p:cNvSpPr>
+            <a:spLocks noGrp="1"/>
+          </p:cNvSpPr>
+          <p:nvPr>
+            <p:ph type="ftr" sz="quarter" idx="11"/>
+          </p:nvPr>
+        </p:nvSpPr>
+        <p:spPr/>
+        <p:txBody>
+          <a:bodyPr/>
+          <a:lstStyle/>
+          <a:p>
+            <a:r>
+              <a:rPr lang="en-US"/>
+              <a:t>Principles of Programming Languages</a:t>
+            </a:r>
+          </a:p>
+        </p:txBody>
+      </p:sp>
+      <p:sp>
+        <p:nvSpPr>
+          <p:cNvPr id="5" name="Slide Number Placeholder 4">
+            <a:extLst>
+              <a:ext uri="{FF2B5EF4-FFF2-40B4-BE49-F238E27FC236}">
+                <a16:creationId xmlns:a16="http://schemas.microsoft.com/office/drawing/2014/main" id="{73F01FD9-6E7E-744C-8E18-EF056B28C1E6}"/>
+              </a:ext>
+            </a:extLst>
+          </p:cNvPr>
+          <p:cNvSpPr>
+            <a:spLocks noGrp="1"/>
+          </p:cNvSpPr>
+          <p:nvPr>
+            <p:ph type="sldNum" sz="quarter" idx="12"/>
+          </p:nvPr>
+        </p:nvSpPr>
+        <p:spPr/>
+        <p:txBody>
+          <a:bodyPr/>
+          <a:lstStyle/>
+          <a:p>
+            <a:fld id="{5BE6834E-C558-0A46-B29B-8DEF3296AFA8}" type="slidenum">
+              <a:rPr lang="en-US" smtClean="0"/>
+              <a:t>18</a:t>
             </a:fld>
             <a:endParaRPr lang="en-US"/>
           </a:p>
@@ -5401,13 +6098,13 @@
           <a:p>
             <a:r>
               <a:rPr lang="en-US" dirty="0"/>
-              <a:t>Mini bio: Born in Venezuela, grew up in Peru (Lima), BS in Peru, CS PhD at Ohio State, Post-Doc at Rice Univ, Assistant Scientist at Brookhaven National Lab (Long Island, NY)</a:t>
-            </a:r>
-          </a:p>
-          <a:p>
-            <a:r>
-              <a:rPr lang="en-US" dirty="0"/>
-              <a:t>Being at OU for a year now. </a:t>
+              <a:t>Mini bio: Born in Venezuela, grew up in Peru (Lima), BS in Peru, CS PhD at Ohio State, Post-Doc at Rice Univ., Assistant Scientist at Brookhaven National Lab (Long Island, NY)</a:t>
+            </a:r>
+          </a:p>
+          <a:p>
+            <a:r>
+              <a:rPr lang="en-US" dirty="0"/>
+              <a:t>Been at OU for a year now. </a:t>
             </a:r>
           </a:p>
           <a:p>
@@ -5419,7 +6116,7 @@
           <a:p>
             <a:r>
               <a:rPr lang="en-US" dirty="0"/>
-              <a:t>Office hours: via Zoom – see announcement in Canvas.</a:t>
+              <a:t>Office hours: via Zoom – see Announcement and Pages space in Canvas. </a:t>
             </a:r>
           </a:p>
           <a:p>
@@ -5438,7 +6135,7 @@
           <a:p>
             <a:r>
               <a:rPr lang="en-US" dirty="0"/>
-              <a:t>I’ll reply to emails from 8am to 8:30am, Monday to Friday</a:t>
+              <a:t>I’ll reply to emails from 8am to 8:30am, Monday to Friday.</a:t>
             </a:r>
           </a:p>
           <a:p>
@@ -5571,7 +6268,7 @@
           <a:p>
             <a:r>
               <a:rPr lang="en-US" dirty="0"/>
-              <a:t>Teaching Assistants</a:t>
+              <a:t>Teaching Assistant</a:t>
             </a:r>
           </a:p>
         </p:txBody>
@@ -5598,46 +6295,167 @@
           <a:lstStyle/>
           <a:p>
             <a:r>
-              <a:rPr lang="en-US" dirty="0"/>
+              <a:rPr lang="en-US" strike="sngStrike" dirty="0"/>
               <a:t>I still haven’t met them </a:t>
             </a:r>
             <a:r>
-              <a:rPr lang="en-US" dirty="0">
+              <a:rPr lang="en-US" strike="sngStrike" dirty="0">
                 <a:sym typeface="Wingdings" pitchFamily="2" charset="2"/>
               </a:rPr>
-              <a:t>  </a:t>
-            </a:r>
-          </a:p>
-          <a:p>
-            <a:r>
-              <a:rPr lang="en-US" dirty="0"/>
-              <a:t>Still don’t have their office hours</a:t>
-            </a:r>
-          </a:p>
-          <a:p>
-            <a:r>
-              <a:rPr lang="en-US" dirty="0"/>
-              <a:t>Still don’t have their emails</a:t>
-            </a:r>
-          </a:p>
-          <a:p>
-            <a:r>
-              <a:rPr lang="en-US" dirty="0"/>
-              <a:t>I hope to have one of them</a:t>
-            </a:r>
-          </a:p>
-          <a:p>
-            <a:r>
-              <a:rPr lang="en-US" dirty="0"/>
-              <a:t>I hope they know the topics of this course </a:t>
-            </a:r>
-            <a:r>
-              <a:rPr lang="en-US" dirty="0">
+              <a:t> :  </a:t>
+            </a:r>
+            <a:r>
+              <a:rPr lang="en-US" dirty="0" err="1">
+                <a:solidFill>
+                  <a:srgbClr val="0070C0"/>
+                </a:solidFill>
                 <a:sym typeface="Wingdings" pitchFamily="2" charset="2"/>
               </a:rPr>
-              <a:t></a:t>
-            </a:r>
-            <a:endParaRPr lang="en-US" dirty="0"/>
+              <a:t>Egawati</a:t>
+            </a:r>
+            <a:r>
+              <a:rPr lang="en-US" dirty="0">
+                <a:solidFill>
+                  <a:srgbClr val="0070C0"/>
+                </a:solidFill>
+                <a:sym typeface="Wingdings" pitchFamily="2" charset="2"/>
+              </a:rPr>
+              <a:t> </a:t>
+            </a:r>
+            <a:r>
+              <a:rPr lang="en-US" dirty="0" err="1">
+                <a:solidFill>
+                  <a:srgbClr val="0070C0"/>
+                </a:solidFill>
+                <a:sym typeface="Wingdings" pitchFamily="2" charset="2"/>
+              </a:rPr>
+              <a:t>Panjei</a:t>
+            </a:r>
+            <a:r>
+              <a:rPr lang="en-US" dirty="0">
+                <a:solidFill>
+                  <a:srgbClr val="0070C0"/>
+                </a:solidFill>
+                <a:sym typeface="Wingdings" pitchFamily="2" charset="2"/>
+              </a:rPr>
+              <a:t> (or just ‘</a:t>
+            </a:r>
+            <a:r>
+              <a:rPr lang="en-US" dirty="0" err="1">
+                <a:solidFill>
+                  <a:srgbClr val="0070C0"/>
+                </a:solidFill>
+                <a:sym typeface="Wingdings" pitchFamily="2" charset="2"/>
+              </a:rPr>
+              <a:t>Ega</a:t>
+            </a:r>
+            <a:r>
+              <a:rPr lang="en-US" dirty="0">
+                <a:solidFill>
+                  <a:srgbClr val="0070C0"/>
+                </a:solidFill>
+                <a:sym typeface="Wingdings" pitchFamily="2" charset="2"/>
+              </a:rPr>
+              <a:t>’)</a:t>
+            </a:r>
+            <a:r>
+              <a:rPr lang="en-US" strike="sngStrike" dirty="0">
+                <a:solidFill>
+                  <a:srgbClr val="0070C0"/>
+                </a:solidFill>
+                <a:sym typeface="Wingdings" pitchFamily="2" charset="2"/>
+              </a:rPr>
+              <a:t> </a:t>
+            </a:r>
+          </a:p>
+          <a:p>
+            <a:r>
+              <a:rPr lang="en-US" strike="sngStrike" dirty="0"/>
+              <a:t>Still don’t have their office hours </a:t>
+            </a:r>
+            <a:r>
+              <a:rPr lang="en-US" dirty="0">
+                <a:solidFill>
+                  <a:srgbClr val="0070C0"/>
+                </a:solidFill>
+              </a:rPr>
+              <a:t>See Canvas Pages</a:t>
+            </a:r>
+          </a:p>
+          <a:p>
+            <a:r>
+              <a:rPr lang="en-US" strike="sngStrike" dirty="0"/>
+              <a:t>Still don’t have their emails</a:t>
+            </a:r>
+            <a:r>
+              <a:rPr lang="en-US" dirty="0"/>
+              <a:t> </a:t>
+            </a:r>
+            <a:r>
+              <a:rPr lang="en-US" dirty="0">
+                <a:solidFill>
+                  <a:srgbClr val="0070C0"/>
+                </a:solidFill>
+              </a:rPr>
+              <a:t>Email: </a:t>
+            </a:r>
+            <a:r>
+              <a:rPr lang="en-US" dirty="0" err="1">
+                <a:solidFill>
+                  <a:srgbClr val="0070C0"/>
+                </a:solidFill>
+              </a:rPr>
+              <a:t>egawati.panjei@ou.edu</a:t>
+            </a:r>
+            <a:endParaRPr lang="en-US" dirty="0">
+              <a:solidFill>
+                <a:srgbClr val="0070C0"/>
+              </a:solidFill>
+            </a:endParaRPr>
+          </a:p>
+          <a:p>
+            <a:r>
+              <a:rPr lang="en-US" strike="sngStrike" dirty="0"/>
+              <a:t>I hope to have one of them</a:t>
+            </a:r>
+            <a:r>
+              <a:rPr lang="en-US" dirty="0"/>
+              <a:t> </a:t>
+            </a:r>
+            <a:r>
+              <a:rPr lang="en-US" dirty="0">
+                <a:solidFill>
+                  <a:srgbClr val="0070C0"/>
+                </a:solidFill>
+              </a:rPr>
+              <a:t>We have one!</a:t>
+            </a:r>
+          </a:p>
+          <a:p>
+            <a:r>
+              <a:rPr lang="en-US" strike="sngStrike" dirty="0"/>
+              <a:t>I hope they know the topics of this course </a:t>
+            </a:r>
+            <a:r>
+              <a:rPr lang="en-US" strike="sngStrike" dirty="0">
+                <a:sym typeface="Wingdings" pitchFamily="2" charset="2"/>
+              </a:rPr>
+              <a:t> </a:t>
+            </a:r>
+            <a:r>
+              <a:rPr lang="en-US" dirty="0">
+                <a:solidFill>
+                  <a:srgbClr val="0070C0"/>
+                </a:solidFill>
+                <a:sym typeface="Wingdings" pitchFamily="2" charset="2"/>
+              </a:rPr>
+              <a:t>She knows the topics of this course</a:t>
+            </a:r>
+            <a:endParaRPr lang="en-US" dirty="0">
+              <a:solidFill>
+                <a:srgbClr val="0070C0"/>
+              </a:solidFill>
+            </a:endParaRPr>
           </a:p>
         </p:txBody>
       </p:sp>
@@ -6035,8 +6853,12 @@
           </a:p>
           <a:p>
             <a:r>
-              <a:rPr lang="en-US" dirty="0"/>
-              <a:t>Likely mandatory to attend for exams (midterm and final).</a:t>
+              <a:rPr lang="en-US" strike="sngStrike" dirty="0"/>
+              <a:t>Likely</a:t>
+            </a:r>
+            <a:r>
+              <a:rPr lang="en-US" dirty="0"/>
+              <a:t> mandatory to attend for exams (midterm and final).</a:t>
             </a:r>
           </a:p>
           <a:p>
@@ -6416,7 +7238,19 @@
             <a:pPr lvl="1"/>
             <a:r>
               <a:rPr lang="en-US" sz="2000" dirty="0"/>
-              <a:t>Pre-midterm quizzes: September 16, September 30, October 7 (Unless we hold midterm this day).</a:t>
+              <a:t>Pre-midterm quizzes: September 16, </a:t>
+            </a:r>
+            <a:r>
+              <a:rPr lang="en-US" sz="2000" dirty="0">
+                <a:solidFill>
+                  <a:srgbClr val="FF0000"/>
+                </a:solidFill>
+              </a:rPr>
+              <a:t>September 25</a:t>
+            </a:r>
+            <a:r>
+              <a:rPr lang="en-US" sz="2000" dirty="0"/>
+              <a:t>, October 7.</a:t>
             </a:r>
             <a:endParaRPr lang="en-US" sz="2000" b="1" dirty="0">
               <a:solidFill>
@@ -6824,7 +7658,7 @@
           <p:nvPr>
             <p:extLst>
               <p:ext uri="{D42A27DB-BD31-4B8C-83A1-F6EECF244321}">
-                <p14:modId xmlns:p14="http://schemas.microsoft.com/office/powerpoint/2010/main" val="162571785"/>
+                <p14:modId xmlns:p14="http://schemas.microsoft.com/office/powerpoint/2010/main" val="2913079042"/>
               </p:ext>
             </p:extLst>
           </p:nvPr>
@@ -7096,8 +7930,12 @@
                     <a:lstStyle/>
                     <a:p>
                       <a:r>
-                        <a:rPr lang="en-US" sz="2400" dirty="0"/>
-                        <a:t>Oct 14</a:t>
+                        <a:rPr lang="en-US" sz="2400" dirty="0">
+                          <a:solidFill>
+                            <a:srgbClr val="FF0000"/>
+                          </a:solidFill>
+                        </a:rPr>
+                        <a:t>Oct 16</a:t>
                       </a:r>
                     </a:p>
                   </a:txBody>
@@ -7172,8 +8010,12 @@
                     <a:lstStyle/>
                     <a:p>
                       <a:r>
-                        <a:rPr lang="en-US" sz="2400" dirty="0"/>
-                        <a:t>Nov 11</a:t>
+                        <a:rPr lang="en-US" sz="2400" dirty="0">
+                          <a:solidFill>
+                            <a:srgbClr val="FF0000"/>
+                          </a:solidFill>
+                        </a:rPr>
+                        <a:t>Nov 9</a:t>
                       </a:r>
                     </a:p>
                   </a:txBody>

</xml_diff>